<commit_message>
now copies tech files as well
</commit_message>
<xml_diff>
--- a/traktor/mapping_ddj_1000/Support files/Source files/DDJ-1000 - Installation Guide.pptx
+++ b/traktor/mapping_ddj_1000/Support files/Source files/DDJ-1000 - Installation Guide.pptx
@@ -5,7 +5,7 @@
     <p:sldMasterId id="2147483648" r:id="rId1"/>
   </p:sldMasterIdLst>
   <p:notesMasterIdLst>
-    <p:notesMasterId r:id="rId32"/>
+    <p:notesMasterId r:id="rId34"/>
   </p:notesMasterIdLst>
   <p:sldIdLst>
     <p:sldId id="277" r:id="rId2"/>
@@ -15,8 +15,8 @@
     <p:sldId id="282" r:id="rId6"/>
     <p:sldId id="266" r:id="rId7"/>
     <p:sldId id="280" r:id="rId8"/>
-    <p:sldId id="296" r:id="rId9"/>
-    <p:sldId id="297" r:id="rId10"/>
+    <p:sldId id="297" r:id="rId9"/>
+    <p:sldId id="296" r:id="rId10"/>
     <p:sldId id="303" r:id="rId11"/>
     <p:sldId id="284" r:id="rId12"/>
     <p:sldId id="279" r:id="rId13"/>
@@ -26,18 +26,20 @@
     <p:sldId id="270" r:id="rId17"/>
     <p:sldId id="301" r:id="rId18"/>
     <p:sldId id="299" r:id="rId19"/>
-    <p:sldId id="287" r:id="rId20"/>
-    <p:sldId id="288" r:id="rId21"/>
-    <p:sldId id="292" r:id="rId22"/>
-    <p:sldId id="293" r:id="rId23"/>
+    <p:sldId id="307" r:id="rId20"/>
+    <p:sldId id="287" r:id="rId21"/>
+    <p:sldId id="288" r:id="rId22"/>
+    <p:sldId id="292" r:id="rId23"/>
     <p:sldId id="302" r:id="rId24"/>
     <p:sldId id="286" r:id="rId25"/>
     <p:sldId id="289" r:id="rId26"/>
-    <p:sldId id="269" r:id="rId27"/>
-    <p:sldId id="290" r:id="rId28"/>
-    <p:sldId id="267" r:id="rId29"/>
-    <p:sldId id="304" r:id="rId30"/>
-    <p:sldId id="305" r:id="rId31"/>
+    <p:sldId id="308" r:id="rId27"/>
+    <p:sldId id="309" r:id="rId28"/>
+    <p:sldId id="269" r:id="rId29"/>
+    <p:sldId id="267" r:id="rId30"/>
+    <p:sldId id="304" r:id="rId31"/>
+    <p:sldId id="305" r:id="rId32"/>
+    <p:sldId id="310" r:id="rId33"/>
   </p:sldIdLst>
   <p:sldSz cx="9144000" cy="6858000" type="screen4x3"/>
   <p:notesSz cx="6858000" cy="9144000"/>
@@ -221,7 +223,7 @@
           <a:p>
             <a:fld id="{FD1106D6-862D-40C1-9815-6CA98A8212E7}" type="datetimeFigureOut">
               <a:rPr lang="en-US" smtClean="0"/>
-              <a:t>10/20/2019</a:t>
+              <a:t>10/21/2019</a:t>
             </a:fld>
             <a:endParaRPr lang="en-US"/>
           </a:p>
@@ -671,7 +673,7 @@
             <a:fld id="{1D8BD707-D9CF-40AE-B4C6-C98DA3205C09}" type="datetimeFigureOut">
               <a:rPr lang="en-US" smtClean="0"/>
               <a:pPr/>
-              <a:t>10/20/2019</a:t>
+              <a:t>10/21/2019</a:t>
             </a:fld>
             <a:endParaRPr lang="en-US"/>
           </a:p>
@@ -838,7 +840,7 @@
             <a:fld id="{1D8BD707-D9CF-40AE-B4C6-C98DA3205C09}" type="datetimeFigureOut">
               <a:rPr lang="en-US" smtClean="0"/>
               <a:pPr/>
-              <a:t>10/20/2019</a:t>
+              <a:t>10/21/2019</a:t>
             </a:fld>
             <a:endParaRPr lang="en-US"/>
           </a:p>
@@ -1015,7 +1017,7 @@
             <a:fld id="{1D8BD707-D9CF-40AE-B4C6-C98DA3205C09}" type="datetimeFigureOut">
               <a:rPr lang="en-US" smtClean="0"/>
               <a:pPr/>
-              <a:t>10/20/2019</a:t>
+              <a:t>10/21/2019</a:t>
             </a:fld>
             <a:endParaRPr lang="en-US"/>
           </a:p>
@@ -1182,7 +1184,7 @@
             <a:fld id="{1D8BD707-D9CF-40AE-B4C6-C98DA3205C09}" type="datetimeFigureOut">
               <a:rPr lang="en-US" smtClean="0"/>
               <a:pPr/>
-              <a:t>10/20/2019</a:t>
+              <a:t>10/21/2019</a:t>
             </a:fld>
             <a:endParaRPr lang="en-US"/>
           </a:p>
@@ -1425,7 +1427,7 @@
             <a:fld id="{1D8BD707-D9CF-40AE-B4C6-C98DA3205C09}" type="datetimeFigureOut">
               <a:rPr lang="en-US" smtClean="0"/>
               <a:pPr/>
-              <a:t>10/20/2019</a:t>
+              <a:t>10/21/2019</a:t>
             </a:fld>
             <a:endParaRPr lang="en-US"/>
           </a:p>
@@ -1710,7 +1712,7 @@
             <a:fld id="{1D8BD707-D9CF-40AE-B4C6-C98DA3205C09}" type="datetimeFigureOut">
               <a:rPr lang="en-US" smtClean="0"/>
               <a:pPr/>
-              <a:t>10/20/2019</a:t>
+              <a:t>10/21/2019</a:t>
             </a:fld>
             <a:endParaRPr lang="en-US"/>
           </a:p>
@@ -2129,7 +2131,7 @@
             <a:fld id="{1D8BD707-D9CF-40AE-B4C6-C98DA3205C09}" type="datetimeFigureOut">
               <a:rPr lang="en-US" smtClean="0"/>
               <a:pPr/>
-              <a:t>10/20/2019</a:t>
+              <a:t>10/21/2019</a:t>
             </a:fld>
             <a:endParaRPr lang="en-US"/>
           </a:p>
@@ -2244,7 +2246,7 @@
             <a:fld id="{1D8BD707-D9CF-40AE-B4C6-C98DA3205C09}" type="datetimeFigureOut">
               <a:rPr lang="en-US" smtClean="0"/>
               <a:pPr/>
-              <a:t>10/20/2019</a:t>
+              <a:t>10/21/2019</a:t>
             </a:fld>
             <a:endParaRPr lang="en-US"/>
           </a:p>
@@ -2336,7 +2338,7 @@
             <a:fld id="{1D8BD707-D9CF-40AE-B4C6-C98DA3205C09}" type="datetimeFigureOut">
               <a:rPr lang="en-US" smtClean="0"/>
               <a:pPr/>
-              <a:t>10/20/2019</a:t>
+              <a:t>10/21/2019</a:t>
             </a:fld>
             <a:endParaRPr lang="en-US"/>
           </a:p>
@@ -2610,7 +2612,7 @@
             <a:fld id="{1D8BD707-D9CF-40AE-B4C6-C98DA3205C09}" type="datetimeFigureOut">
               <a:rPr lang="en-US" smtClean="0"/>
               <a:pPr/>
-              <a:t>10/20/2019</a:t>
+              <a:t>10/21/2019</a:t>
             </a:fld>
             <a:endParaRPr lang="en-US"/>
           </a:p>
@@ -2860,7 +2862,7 @@
             <a:fld id="{1D8BD707-D9CF-40AE-B4C6-C98DA3205C09}" type="datetimeFigureOut">
               <a:rPr lang="en-US" smtClean="0"/>
               <a:pPr/>
-              <a:t>10/20/2019</a:t>
+              <a:t>10/21/2019</a:t>
             </a:fld>
             <a:endParaRPr lang="en-US"/>
           </a:p>
@@ -3070,7 +3072,7 @@
             <a:fld id="{1D8BD707-D9CF-40AE-B4C6-C98DA3205C09}" type="datetimeFigureOut">
               <a:rPr lang="en-US" smtClean="0"/>
               <a:pPr/>
-              <a:t>10/20/2019</a:t>
+              <a:t>10/21/2019</a:t>
             </a:fld>
             <a:endParaRPr lang="en-US"/>
           </a:p>
@@ -3487,8 +3489,8 @@
         </p:nvSpPr>
         <p:spPr>
           <a:xfrm>
-            <a:off x="308919" y="3352800"/>
-            <a:ext cx="8382000" cy="1938992"/>
+            <a:off x="76200" y="3352800"/>
+            <a:ext cx="8915399" cy="1631216"/>
           </a:xfrm>
           <a:prstGeom prst="rect">
             <a:avLst/>
@@ -3534,30 +3536,31 @@
             </a:br>
             <a:r>
               <a:rPr lang="en-US" sz="2000" i="1" dirty="0" smtClean="0"/>
-              <a:t>Steps </a:t>
+              <a:t>Steps are first </a:t>
+            </a:r>
+            <a:r>
+              <a:rPr lang="en-US" sz="2000" i="1" u="sng" dirty="0" smtClean="0"/>
+              <a:t>explained</a:t>
             </a:r>
             <a:r>
               <a:rPr lang="en-US" sz="2000" i="1" dirty="0" smtClean="0"/>
-              <a:t>are first explained </a:t>
+              <a:t>, then </a:t>
+            </a:r>
+            <a:r>
+              <a:rPr lang="en-US" sz="2000" i="1" u="sng" dirty="0" smtClean="0"/>
+              <a:t>shown</a:t>
             </a:r>
             <a:r>
               <a:rPr lang="en-US" sz="2000" i="1" dirty="0" smtClean="0"/>
-              <a:t>in a single page, then </a:t>
+              <a:t> via screenshots. </a:t>
+            </a:r>
+            <a:r>
+              <a:rPr lang="en-US" sz="2000" i="1" u="sng" dirty="0" smtClean="0"/>
+              <a:t>Do not skip any step</a:t>
             </a:r>
             <a:r>
               <a:rPr lang="en-US" sz="2000" i="1" dirty="0" smtClean="0"/>
-              <a:t>followed by detailed </a:t>
-            </a:r>
-            <a:r>
-              <a:rPr lang="en-US" sz="2000" i="1" dirty="0" smtClean="0"/>
-              <a:t>screenshots</a:t>
-            </a:r>
-          </a:p>
-          <a:p>
-            <a:pPr algn="ctr"/>
-            <a:r>
-              <a:rPr lang="en-US" sz="2000" i="1" dirty="0" smtClean="0"/>
-              <a:t>Do not skip any step!</a:t>
+              <a:t>!</a:t>
             </a:r>
           </a:p>
           <a:p>
@@ -3571,17 +3574,8 @@
             </a:br>
             <a:r>
               <a:rPr lang="en-US" sz="2000" i="1" dirty="0" smtClean="0"/>
-              <a:t>See </a:t>
-            </a:r>
-            <a:r>
-              <a:rPr lang="en-US" sz="2000" i="1" dirty="0" smtClean="0"/>
-              <a:t>also the </a:t>
-            </a:r>
-            <a:r>
-              <a:rPr lang="en-US" sz="2000" i="1" dirty="0" smtClean="0"/>
-              <a:t>installation FAQ (this a separate pdf file)</a:t>
-            </a:r>
-            <a:endParaRPr lang="en-US" sz="2000" i="1" dirty="0" smtClean="0"/>
+              <a:t>See also the installation FAQ (on a separate pdf file).</a:t>
+            </a:r>
           </a:p>
         </p:txBody>
       </p:sp>
@@ -3718,7 +3712,7 @@
         <p:spPr>
           <a:xfrm>
             <a:off x="304800" y="457200"/>
-            <a:ext cx="8064911" cy="5078313"/>
+            <a:ext cx="8610600" cy="4524315"/>
           </a:xfrm>
           <a:prstGeom prst="rect">
             <a:avLst/>
@@ -3733,7 +3727,7 @@
           <a:p>
             <a:r>
               <a:rPr lang="en-US" b="1" dirty="0" smtClean="0"/>
-              <a:t>BOME VERIFICATION:</a:t>
+              <a:t>BOME VERIFICATION STEPS:</a:t>
             </a:r>
           </a:p>
           <a:p>
@@ -3743,7 +3737,35 @@
             </a:pPr>
             <a:r>
               <a:rPr lang="en-US" dirty="0"/>
-              <a:t>Confirm the BMT1 device is created (short format)</a:t>
+              <a:t>Confirm the </a:t>
+            </a:r>
+            <a:r>
+              <a:rPr lang="en-US" dirty="0" smtClean="0"/>
+              <a:t>“</a:t>
+            </a:r>
+            <a:r>
+              <a:rPr lang="en-US" dirty="0" err="1" smtClean="0"/>
+              <a:t>Bome</a:t>
+            </a:r>
+            <a:r>
+              <a:rPr lang="en-US" dirty="0" smtClean="0"/>
+              <a:t> MIDI Translator 1” device </a:t>
+            </a:r>
+            <a:r>
+              <a:rPr lang="en-US" dirty="0"/>
+              <a:t>is created </a:t>
+            </a:r>
+            <a:r>
+              <a:rPr lang="en-US" dirty="0" smtClean="0"/>
+              <a:t>(</a:t>
+            </a:r>
+            <a:r>
+              <a:rPr lang="en-US" dirty="0" err="1" smtClean="0"/>
+              <a:t>longformat</a:t>
+            </a:r>
+            <a:r>
+              <a:rPr lang="en-US" dirty="0"/>
+              <a:t>)</a:t>
             </a:r>
           </a:p>
           <a:p>
@@ -3761,15 +3783,7 @@
             </a:r>
             <a:r>
               <a:rPr lang="en-US" dirty="0" smtClean="0"/>
-              <a:t>short </a:t>
-            </a:r>
-            <a:r>
-              <a:rPr lang="en-US" dirty="0"/>
-              <a:t>port </a:t>
-            </a:r>
-            <a:r>
-              <a:rPr lang="en-US" dirty="0" smtClean="0"/>
-              <a:t>names</a:t>
+              <a:t>long port names</a:t>
             </a:r>
           </a:p>
           <a:p>
@@ -3786,7 +3800,7 @@
             </a:pPr>
             <a:r>
               <a:rPr lang="en-US" dirty="0" smtClean="0"/>
-              <a:t>Confirm 4x midi ports are opened correctly</a:t>
+              <a:t>Confirm the 4x midi ports were opened correctly</a:t>
             </a:r>
           </a:p>
           <a:p>
@@ -3817,7 +3831,7 @@
             </a:pPr>
             <a:r>
               <a:rPr lang="en-US" dirty="0" smtClean="0"/>
-              <a:t>Confirm DDJ talks to BOME</a:t>
+              <a:t>Confirm that the Controller talks to BOME</a:t>
             </a:r>
           </a:p>
           <a:p>
@@ -3848,7 +3862,7 @@
             </a:pPr>
             <a:r>
               <a:rPr lang="en-US" dirty="0" smtClean="0"/>
-              <a:t>Confirm the BOME clock is running</a:t>
+              <a:t>Confirm that the BOME clock is running</a:t>
             </a:r>
           </a:p>
           <a:p>
@@ -3862,8 +3876,23 @@
             </a:r>
             <a:r>
               <a:rPr lang="en-US" dirty="0" smtClean="0"/>
-              <a:t>Click log window; click “rules”; see lots of messages flowing; unclick “rules”</a:t>
-            </a:r>
+              <a:t>Click log window; click “rules”; see a lot of messages appearing </a:t>
+            </a:r>
+          </a:p>
+          <a:p>
+            <a:pPr marL="1257300" lvl="2" indent="-342900">
+              <a:buFont typeface="+mj-lt"/>
+              <a:buAutoNum type="arabicPeriod"/>
+            </a:pPr>
+            <a:r>
+              <a:rPr lang="en-US" dirty="0" smtClean="0"/>
+              <a:t>unclick “rules” to stop </a:t>
+            </a:r>
+            <a:r>
+              <a:rPr lang="en-US" dirty="0" err="1" smtClean="0"/>
+              <a:t>loggin</a:t>
+            </a:r>
+            <a:endParaRPr lang="en-US" dirty="0" smtClean="0"/>
           </a:p>
           <a:p>
             <a:pPr marL="1257300" lvl="2" indent="-342900">
@@ -4314,43 +4343,9 @@
           </a:extLst>
         </p:spPr>
       </p:pic>
-      <p:sp>
-        <p:nvSpPr>
-          <p:cNvPr id="11" name="TextBox 10"/>
-          <p:cNvSpPr txBox="1"/>
-          <p:nvPr/>
-        </p:nvSpPr>
-        <p:spPr>
-          <a:xfrm>
-            <a:off x="152400" y="111145"/>
-            <a:ext cx="4010970" cy="461665"/>
-          </a:xfrm>
-          <a:prstGeom prst="rect">
-            <a:avLst/>
-          </a:prstGeom>
-          <a:noFill/>
-        </p:spPr>
-        <p:txBody>
-          <a:bodyPr wrap="none" rtlCol="0">
-            <a:spAutoFit/>
-          </a:bodyPr>
-          <a:lstStyle/>
-          <a:p>
-            <a:r>
-              <a:rPr lang="en-US" sz="2400" i="1" u="sng" dirty="0" smtClean="0"/>
-              <a:t>BOME settings: </a:t>
-            </a:r>
-            <a:r>
-              <a:rPr lang="en-US" sz="2400" i="1" u="sng" dirty="0" smtClean="0"/>
-              <a:t>device “BMT1”</a:t>
-            </a:r>
-            <a:endParaRPr lang="en-US" sz="2400" i="1" u="sng" dirty="0"/>
-          </a:p>
-        </p:txBody>
-      </p:sp>
       <p:pic>
         <p:nvPicPr>
-          <p:cNvPr id="33" name="Picture 3" descr="C:\Users\Pedro\Desktop\Z_DRIVE_Pedro\2 Music - Controllers\0_MAPS_Traktor\DDJ Pioneer\v6.5.0 - DDJ-1000 - TP3_TP2 BOME\Support files\Source files\Installation\2 - BOME - configuration Virtual Device.JPG"/>
+          <p:cNvPr id="1026" name="Picture 2"/>
           <p:cNvPicPr>
             <a:picLocks noChangeAspect="1" noChangeArrowheads="1"/>
           </p:cNvPicPr>
@@ -4371,24 +4366,67 @@
         </p:blipFill>
         <p:spPr bwMode="auto">
           <a:xfrm>
-            <a:off x="1869148" y="2286000"/>
-            <a:ext cx="3990975" cy="2457450"/>
+            <a:off x="1680287" y="1986131"/>
+            <a:ext cx="4048125" cy="2838009"/>
           </a:xfrm>
           <a:prstGeom prst="rect">
             <a:avLst/>
           </a:prstGeom>
           <a:noFill/>
+          <a:ln>
+            <a:noFill/>
+          </a:ln>
           <a:extLst>
             <a:ext uri="{909E8E84-426E-40DD-AFC4-6F175D3DCCD1}">
               <a14:hiddenFill xmlns:a14="http://schemas.microsoft.com/office/drawing/2010/main">
                 <a:solidFill>
-                  <a:srgbClr val="FFFFFF"/>
+                  <a:schemeClr val="accent1"/>
                 </a:solidFill>
               </a14:hiddenFill>
             </a:ext>
+            <a:ext uri="{91240B29-F687-4F45-9708-019B960494DF}">
+              <a14:hiddenLine xmlns:a14="http://schemas.microsoft.com/office/drawing/2010/main" w="9525">
+                <a:solidFill>
+                  <a:schemeClr val="tx1"/>
+                </a:solidFill>
+                <a:miter lim="800000"/>
+                <a:headEnd/>
+                <a:tailEnd/>
+              </a14:hiddenLine>
+            </a:ext>
           </a:extLst>
         </p:spPr>
       </p:pic>
+      <p:sp>
+        <p:nvSpPr>
+          <p:cNvPr id="11" name="TextBox 10"/>
+          <p:cNvSpPr txBox="1"/>
+          <p:nvPr/>
+        </p:nvSpPr>
+        <p:spPr>
+          <a:xfrm>
+            <a:off x="152400" y="111145"/>
+            <a:ext cx="4937506" cy="461665"/>
+          </a:xfrm>
+          <a:prstGeom prst="rect">
+            <a:avLst/>
+          </a:prstGeom>
+          <a:noFill/>
+        </p:spPr>
+        <p:txBody>
+          <a:bodyPr wrap="none" rtlCol="0">
+            <a:spAutoFit/>
+          </a:bodyPr>
+          <a:lstStyle/>
+          <a:p>
+            <a:r>
+              <a:rPr lang="en-US" sz="2400" i="1" u="sng" dirty="0" smtClean="0"/>
+              <a:t>BOME settings: long port name device</a:t>
+            </a:r>
+            <a:endParaRPr lang="en-US" sz="2400" i="1" u="sng" dirty="0"/>
+          </a:p>
+        </p:txBody>
+      </p:sp>
       <p:sp>
         <p:nvSpPr>
           <p:cNvPr id="34" name="Oval 33"/>
@@ -4397,7 +4435,7 @@
         </p:nvSpPr>
         <p:spPr>
           <a:xfrm>
-            <a:off x="2911197" y="3242413"/>
+            <a:off x="2785070" y="3010025"/>
             <a:ext cx="1134202" cy="325446"/>
           </a:xfrm>
           <a:prstGeom prst="ellipse">
@@ -4490,7 +4528,7 @@
         <p:spPr>
           <a:xfrm>
             <a:off x="1854898" y="3242413"/>
-            <a:ext cx="1134202" cy="325446"/>
+            <a:ext cx="930172" cy="325446"/>
           </a:xfrm>
           <a:prstGeom prst="ellipse">
             <a:avLst/>
@@ -4535,7 +4573,7 @@
         </p:nvSpPr>
         <p:spPr>
           <a:xfrm>
-            <a:off x="2989100" y="3689268"/>
+            <a:off x="2732870" y="3410558"/>
             <a:ext cx="1430500" cy="325446"/>
           </a:xfrm>
           <a:prstGeom prst="ellipse">
@@ -4588,8 +4626,8 @@
             <a:avLst>
               <a:gd name="adj1" fmla="val 45417"/>
               <a:gd name="adj2" fmla="val -2669"/>
-              <a:gd name="adj3" fmla="val 360586"/>
-              <a:gd name="adj4" fmla="val -203547"/>
+              <a:gd name="adj3" fmla="val 241484"/>
+              <a:gd name="adj4" fmla="val -222170"/>
             </a:avLst>
           </a:prstGeom>
           <a:solidFill>
@@ -4629,7 +4667,7 @@
                   <a:schemeClr val="tx1"/>
                 </a:solidFill>
               </a:rPr>
-              <a:t>Short port names!</a:t>
+              <a:t>Long port names!</a:t>
             </a:r>
             <a:endParaRPr lang="en-US" sz="1200" dirty="0">
               <a:solidFill>
@@ -6081,7 +6119,7 @@
         <p:spPr>
           <a:xfrm>
             <a:off x="285750" y="457200"/>
-            <a:ext cx="8064911" cy="3139321"/>
+            <a:ext cx="8064911" cy="5355312"/>
           </a:xfrm>
           <a:prstGeom prst="rect">
             <a:avLst/>
@@ -6096,8 +6134,9 @@
           <a:p>
             <a:r>
               <a:rPr lang="en-US" b="1" dirty="0" smtClean="0"/>
-              <a:t>INSTALL TRAKTOR MAPPING:</a:t>
-            </a:r>
+              <a:t>CREATE A BACKUP:</a:t>
+            </a:r>
+            <a:endParaRPr lang="en-US" b="1" dirty="0"/>
           </a:p>
           <a:p>
             <a:pPr marL="800100" lvl="1" indent="-342900">
@@ -6106,12 +6145,35 @@
             </a:pPr>
             <a:r>
               <a:rPr lang="en-US" dirty="0" smtClean="0"/>
-              <a:t>Open </a:t>
+              <a:t>Note: the mapping replaces a lot of your settings.  In any cases, </a:t>
             </a:r>
             <a:r>
               <a:rPr lang="en-US" dirty="0" err="1" smtClean="0"/>
               <a:t>Traktor</a:t>
             </a:r>
+            <a:r>
+              <a:rPr lang="en-US" dirty="0" smtClean="0"/>
+              <a:t> always makes automatic backups </a:t>
+            </a:r>
+            <a:r>
+              <a:rPr lang="en-US" dirty="0"/>
+              <a:t>in </a:t>
+            </a:r>
+            <a:r>
+              <a:rPr lang="en-US" dirty="0" smtClean="0"/>
+              <a:t>“</a:t>
+            </a:r>
+            <a:r>
+              <a:rPr lang="en-US" dirty="0" err="1" smtClean="0"/>
+              <a:t>Root_Dir</a:t>
+            </a:r>
+            <a:r>
+              <a:rPr lang="en-US" dirty="0" smtClean="0"/>
+              <a:t>\Backup\Settings”</a:t>
+            </a:r>
+          </a:p>
+          <a:p>
+            <a:pPr lvl="1"/>
             <a:endParaRPr lang="en-US" dirty="0" smtClean="0"/>
           </a:p>
           <a:p>
@@ -6121,8 +6183,13 @@
             </a:pPr>
             <a:r>
               <a:rPr lang="en-US" dirty="0" smtClean="0"/>
-              <a:t>Click Settings</a:t>
-            </a:r>
+              <a:t>Open </a:t>
+            </a:r>
+            <a:r>
+              <a:rPr lang="en-US" dirty="0" err="1" smtClean="0"/>
+              <a:t>Traktor</a:t>
+            </a:r>
+            <a:endParaRPr lang="en-US" dirty="0" smtClean="0"/>
           </a:p>
           <a:p>
             <a:pPr marL="800100" lvl="1" indent="-342900">
@@ -6131,7 +6198,11 @@
             </a:pPr>
             <a:r>
               <a:rPr lang="en-US" dirty="0" smtClean="0"/>
-              <a:t>Click big “import button” on lower left corner</a:t>
+              <a:t>Click </a:t>
+            </a:r>
+            <a:r>
+              <a:rPr lang="en-US" dirty="0"/>
+              <a:t>Settings</a:t>
             </a:r>
           </a:p>
           <a:p>
@@ -6140,8 +6211,76 @@
               <a:buAutoNum type="arabicPeriod"/>
             </a:pPr>
             <a:r>
+              <a:rPr lang="en-US" dirty="0"/>
+              <a:t>Click big </a:t>
+            </a:r>
+            <a:r>
               <a:rPr lang="en-US" dirty="0" smtClean="0"/>
-              <a:t>Accept all check settings, PLUS additionally the “Audio device settings”</a:t>
+              <a:t>“export button</a:t>
+            </a:r>
+            <a:r>
+              <a:rPr lang="en-US" dirty="0"/>
+              <a:t>” on lower left corner</a:t>
+            </a:r>
+          </a:p>
+          <a:p>
+            <a:pPr marL="800100" lvl="1" indent="-342900">
+              <a:buFont typeface="+mj-lt"/>
+              <a:buAutoNum type="arabicPeriod"/>
+            </a:pPr>
+            <a:r>
+              <a:rPr lang="en-US" dirty="0" smtClean="0"/>
+              <a:t>Ensure all settings are clicked</a:t>
+            </a:r>
+          </a:p>
+          <a:p>
+            <a:pPr marL="800100" lvl="1" indent="-342900">
+              <a:buFont typeface="+mj-lt"/>
+              <a:buAutoNum type="arabicPeriod"/>
+            </a:pPr>
+            <a:r>
+              <a:rPr lang="en-US" dirty="0" smtClean="0"/>
+              <a:t>Save the file</a:t>
+            </a:r>
+            <a:endParaRPr lang="en-US" dirty="0"/>
+          </a:p>
+          <a:p>
+            <a:endParaRPr lang="en-US" b="1" dirty="0"/>
+          </a:p>
+          <a:p>
+            <a:r>
+              <a:rPr lang="en-US" b="1" dirty="0" smtClean="0"/>
+              <a:t>INSTALL TRAKTOR MAPPING:</a:t>
+            </a:r>
+          </a:p>
+          <a:p>
+            <a:pPr marL="800100" lvl="1" indent="-342900">
+              <a:buFont typeface="+mj-lt"/>
+              <a:buAutoNum type="arabicPeriod"/>
+            </a:pPr>
+            <a:r>
+              <a:rPr lang="en-US" dirty="0" smtClean="0"/>
+              <a:t>Click Settings</a:t>
+            </a:r>
+          </a:p>
+          <a:p>
+            <a:pPr marL="800100" lvl="1" indent="-342900">
+              <a:buFont typeface="+mj-lt"/>
+              <a:buAutoNum type="arabicPeriod"/>
+            </a:pPr>
+            <a:r>
+              <a:rPr lang="en-US" dirty="0" smtClean="0"/>
+              <a:t>Click big “import button” on lower left corner</a:t>
+            </a:r>
+          </a:p>
+          <a:p>
+            <a:pPr marL="800100" lvl="1" indent="-342900">
+              <a:buFont typeface="+mj-lt"/>
+              <a:buAutoNum type="arabicPeriod"/>
+            </a:pPr>
+            <a:r>
+              <a:rPr lang="en-US" dirty="0" smtClean="0"/>
+              <a:t>Accept all checks;  PLUS additionally click the “Audio device settings”</a:t>
             </a:r>
           </a:p>
           <a:p>
@@ -6156,7 +6295,18 @@
               <a:buFont typeface="+mj-lt"/>
               <a:buAutoNum type="arabicPeriod"/>
             </a:pPr>
-            <a:endParaRPr lang="en-US" dirty="0"/>
+            <a:endParaRPr lang="en-US" dirty="0" smtClean="0"/>
+          </a:p>
+          <a:p>
+            <a:r>
+              <a:rPr lang="en-US" b="1" dirty="0"/>
+              <a:t>INSTALL TRAKTOR </a:t>
+            </a:r>
+            <a:r>
+              <a:rPr lang="en-US" b="1" dirty="0" smtClean="0"/>
+              <a:t>MAPPING (second time):</a:t>
+            </a:r>
+            <a:endParaRPr lang="en-US" b="1" dirty="0"/>
           </a:p>
           <a:p>
             <a:pPr marL="800100" lvl="1" indent="-342900">
@@ -6165,43 +6315,89 @@
             </a:pPr>
             <a:r>
               <a:rPr lang="en-US" dirty="0" smtClean="0"/>
-              <a:t>Repeat the mapping installation a second time. </a:t>
-            </a:r>
-          </a:p>
-          <a:p>
-            <a:pPr marL="1257300" lvl="2" indent="-342900">
-              <a:buFont typeface="Arial" panose="020B0604020202020204" pitchFamily="34" charset="0"/>
-              <a:buChar char="•"/>
-            </a:pPr>
-            <a:r>
-              <a:rPr lang="en-US" i="1" dirty="0" smtClean="0"/>
-              <a:t>This is only requires to confirm the FX list is correct </a:t>
-            </a:r>
-          </a:p>
-          <a:p>
-            <a:pPr marL="1257300" lvl="2" indent="-342900">
-              <a:buFont typeface="Arial" panose="020B0604020202020204" pitchFamily="34" charset="0"/>
-              <a:buChar char="•"/>
-            </a:pPr>
-            <a:r>
-              <a:rPr lang="en-US" i="1" dirty="0" smtClean="0"/>
-              <a:t>(this is a </a:t>
-            </a:r>
-            <a:r>
-              <a:rPr lang="en-US" i="1" dirty="0" err="1" smtClean="0"/>
-              <a:t>Traktor</a:t>
-            </a:r>
-            <a:r>
-              <a:rPr lang="en-US" i="1" dirty="0" smtClean="0"/>
-              <a:t> bug that is going on for years)!</a:t>
-            </a:r>
-          </a:p>
-          <a:p>
-            <a:pPr marL="800100" lvl="1" indent="-342900">
-              <a:buFont typeface="+mj-lt"/>
-              <a:buAutoNum type="arabicPeriod"/>
-            </a:pPr>
-            <a:endParaRPr lang="en-US" dirty="0" smtClean="0"/>
+              <a:t>Repeat above process a second time. This is </a:t>
+            </a:r>
+            <a:r>
+              <a:rPr lang="en-US" u="sng" dirty="0" smtClean="0"/>
+              <a:t>only </a:t>
+            </a:r>
+            <a:r>
+              <a:rPr lang="en-US" dirty="0" smtClean="0"/>
+              <a:t>to avoid a </a:t>
+            </a:r>
+            <a:r>
+              <a:rPr lang="en-US" dirty="0" err="1"/>
+              <a:t>T</a:t>
+            </a:r>
+            <a:r>
+              <a:rPr lang="en-US" dirty="0" err="1" smtClean="0"/>
+              <a:t>raktor</a:t>
+            </a:r>
+            <a:r>
+              <a:rPr lang="en-US" dirty="0" smtClean="0"/>
+              <a:t> bug that gets the FX list wrong.</a:t>
+            </a:r>
+          </a:p>
+        </p:txBody>
+      </p:sp>
+      <p:sp>
+        <p:nvSpPr>
+          <p:cNvPr id="4" name="Left Arrow 3"/>
+          <p:cNvSpPr/>
+          <p:nvPr/>
+        </p:nvSpPr>
+        <p:spPr>
+          <a:xfrm>
+            <a:off x="7713785" y="3962400"/>
+            <a:ext cx="1295400" cy="507517"/>
+          </a:xfrm>
+          <a:prstGeom prst="leftArrow">
+            <a:avLst>
+              <a:gd name="adj1" fmla="val 50000"/>
+              <a:gd name="adj2" fmla="val 50000"/>
+            </a:avLst>
+          </a:prstGeom>
+          <a:solidFill>
+            <a:schemeClr val="accent6">
+              <a:lumMod val="40000"/>
+              <a:lumOff val="60000"/>
+            </a:schemeClr>
+          </a:solidFill>
+        </p:spPr>
+        <p:style>
+          <a:lnRef idx="2">
+            <a:schemeClr val="accent1">
+              <a:shade val="50000"/>
+            </a:schemeClr>
+          </a:lnRef>
+          <a:fillRef idx="1">
+            <a:schemeClr val="accent1"/>
+          </a:fillRef>
+          <a:effectRef idx="0">
+            <a:schemeClr val="accent1"/>
+          </a:effectRef>
+          <a:fontRef idx="minor">
+            <a:schemeClr val="lt1"/>
+          </a:fontRef>
+        </p:style>
+        <p:txBody>
+          <a:bodyPr rtlCol="0" anchor="ctr"/>
+          <a:lstStyle/>
+          <a:p>
+            <a:pPr algn="ctr"/>
+            <a:r>
+              <a:rPr lang="en-US" dirty="0" smtClean="0">
+                <a:solidFill>
+                  <a:schemeClr val="tx1"/>
+                </a:solidFill>
+              </a:rPr>
+              <a:t>Extra click</a:t>
+            </a:r>
+            <a:endParaRPr lang="en-US" dirty="0">
+              <a:solidFill>
+                <a:schemeClr val="tx1"/>
+              </a:solidFill>
+            </a:endParaRPr>
           </a:p>
         </p:txBody>
       </p:sp>
@@ -6237,7 +6433,7 @@
       </p:grpSpPr>
       <p:pic>
         <p:nvPicPr>
-          <p:cNvPr id="4098" name="Picture 2" descr="C:\Users\Pedro\Desktop\Z_DRIVE_Pedro\2 Music - Controllers\0_MAPS_Traktor\DDJ Pioneer\v6.5.1 - DDJ-1000 - TP3_TP2 BOME\Support files\Source files\Installation\Traktor\1 - instll traktor mapping.JPG"/>
+          <p:cNvPr id="2051" name="Picture 3"/>
           <p:cNvPicPr>
             <a:picLocks noChangeAspect="1" noChangeArrowheads="1"/>
           </p:cNvPicPr>
@@ -6258,21 +6454,34 @@
         </p:blipFill>
         <p:spPr bwMode="auto">
           <a:xfrm>
-            <a:off x="1171575" y="601385"/>
-            <a:ext cx="7162800" cy="5981731"/>
+            <a:off x="381000" y="823179"/>
+            <a:ext cx="8253436" cy="5595205"/>
           </a:xfrm>
           <a:prstGeom prst="rect">
             <a:avLst/>
           </a:prstGeom>
           <a:noFill/>
+          <a:ln>
+            <a:noFill/>
+          </a:ln>
           <a:extLst>
             <a:ext uri="{909E8E84-426E-40DD-AFC4-6F175D3DCCD1}">
               <a14:hiddenFill xmlns:a14="http://schemas.microsoft.com/office/drawing/2010/main">
                 <a:solidFill>
-                  <a:srgbClr val="FFFFFF"/>
+                  <a:schemeClr val="accent1"/>
                 </a:solidFill>
               </a14:hiddenFill>
             </a:ext>
+            <a:ext uri="{91240B29-F687-4F45-9708-019B960494DF}">
+              <a14:hiddenLine xmlns:a14="http://schemas.microsoft.com/office/drawing/2010/main" w="9525">
+                <a:solidFill>
+                  <a:schemeClr val="tx1"/>
+                </a:solidFill>
+                <a:miter lim="800000"/>
+                <a:headEnd/>
+                <a:tailEnd/>
+              </a14:hiddenLine>
+            </a:ext>
           </a:extLst>
         </p:spPr>
       </p:pic>
@@ -6285,7 +6494,7 @@
         <p:spPr>
           <a:xfrm>
             <a:off x="152400" y="111145"/>
-            <a:ext cx="3519105" cy="461665"/>
+            <a:ext cx="5252079" cy="461665"/>
           </a:xfrm>
           <a:prstGeom prst="rect">
             <a:avLst/>
@@ -6300,7 +6509,7 @@
           <a:p>
             <a:r>
               <a:rPr lang="en-US" sz="2400" i="1" u="sng" dirty="0" smtClean="0"/>
-              <a:t>TRAKTOR: import mapping</a:t>
+              <a:t>TRAKTOR: create backup of your settings</a:t>
             </a:r>
             <a:endParaRPr lang="en-US" sz="2400" i="1" u="sng" dirty="0"/>
           </a:p>
@@ -6314,7 +6523,7 @@
         </p:nvSpPr>
         <p:spPr>
           <a:xfrm>
-            <a:off x="7010400" y="895350"/>
+            <a:off x="7162800" y="1104900"/>
             <a:ext cx="304800" cy="342900"/>
           </a:xfrm>
           <a:prstGeom prst="ellipse">
@@ -6360,7 +6569,7 @@
         </p:nvSpPr>
         <p:spPr>
           <a:xfrm>
-            <a:off x="1854018" y="5457825"/>
+            <a:off x="1854018" y="6019800"/>
             <a:ext cx="736782" cy="304800"/>
           </a:xfrm>
           <a:prstGeom prst="ellipse">
@@ -6398,6 +6607,60 @@
           </a:p>
         </p:txBody>
       </p:sp>
+      <p:pic>
+        <p:nvPicPr>
+          <p:cNvPr id="2052" name="Picture 4"/>
+          <p:cNvPicPr>
+            <a:picLocks noChangeAspect="1" noChangeArrowheads="1"/>
+          </p:cNvPicPr>
+          <p:nvPr/>
+        </p:nvPicPr>
+        <p:blipFill>
+          <a:blip r:embed="rId3">
+            <a:extLst>
+              <a:ext uri="{28A0092B-C50C-407E-A947-70E740481C1C}">
+                <a14:useLocalDpi xmlns:a14="http://schemas.microsoft.com/office/drawing/2010/main" val="0"/>
+              </a:ext>
+            </a:extLst>
+          </a:blip>
+          <a:srcRect/>
+          <a:stretch>
+            <a:fillRect/>
+          </a:stretch>
+        </p:blipFill>
+        <p:spPr bwMode="auto">
+          <a:xfrm>
+            <a:off x="5715000" y="2997995"/>
+            <a:ext cx="2176099" cy="2386012"/>
+          </a:xfrm>
+          <a:prstGeom prst="rect">
+            <a:avLst/>
+          </a:prstGeom>
+          <a:noFill/>
+          <a:ln>
+            <a:noFill/>
+          </a:ln>
+          <a:extLst>
+            <a:ext uri="{909E8E84-426E-40DD-AFC4-6F175D3DCCD1}">
+              <a14:hiddenFill xmlns:a14="http://schemas.microsoft.com/office/drawing/2010/main">
+                <a:solidFill>
+                  <a:schemeClr val="accent1"/>
+                </a:solidFill>
+              </a14:hiddenFill>
+            </a:ext>
+            <a:ext uri="{91240B29-F687-4F45-9708-019B960494DF}">
+              <a14:hiddenLine xmlns:a14="http://schemas.microsoft.com/office/drawing/2010/main" w="9525">
+                <a:solidFill>
+                  <a:schemeClr val="tx1"/>
+                </a:solidFill>
+                <a:miter lim="800000"/>
+                <a:headEnd/>
+                <a:tailEnd/>
+              </a14:hiddenLine>
+            </a:ext>
+          </a:extLst>
+        </p:spPr>
+      </p:pic>
       <p:sp>
         <p:nvSpPr>
           <p:cNvPr id="10" name="Oval 9"/>
@@ -6406,8 +6669,8 @@
         </p:nvSpPr>
         <p:spPr>
           <a:xfrm>
-            <a:off x="5486400" y="4495800"/>
-            <a:ext cx="1600200" cy="304800"/>
+            <a:off x="5732585" y="2997995"/>
+            <a:ext cx="439615" cy="2388393"/>
           </a:xfrm>
           <a:prstGeom prst="ellipse">
             <a:avLst/>
@@ -6444,10 +6707,76 @@
           </a:p>
         </p:txBody>
       </p:sp>
+      <p:sp>
+        <p:nvSpPr>
+          <p:cNvPr id="12" name="Line Callout 1 (Accent Bar) 11"/>
+          <p:cNvSpPr/>
+          <p:nvPr/>
+        </p:nvSpPr>
+        <p:spPr>
+          <a:xfrm>
+            <a:off x="7281498" y="2209800"/>
+            <a:ext cx="1352937" cy="457200"/>
+          </a:xfrm>
+          <a:prstGeom prst="accentCallout1">
+            <a:avLst>
+              <a:gd name="adj1" fmla="val 45417"/>
+              <a:gd name="adj2" fmla="val -2669"/>
+              <a:gd name="adj3" fmla="val 188608"/>
+              <a:gd name="adj4" fmla="val -92640"/>
+            </a:avLst>
+          </a:prstGeom>
+          <a:solidFill>
+            <a:schemeClr val="bg1">
+              <a:lumMod val="85000"/>
+            </a:schemeClr>
+          </a:solidFill>
+          <a:ln w="38100">
+            <a:solidFill>
+              <a:schemeClr val="accent2"/>
+            </a:solidFill>
+          </a:ln>
+        </p:spPr>
+        <p:style>
+          <a:lnRef idx="2">
+            <a:schemeClr val="accent1">
+              <a:shade val="50000"/>
+            </a:schemeClr>
+          </a:lnRef>
+          <a:fillRef idx="1">
+            <a:schemeClr val="accent1"/>
+          </a:fillRef>
+          <a:effectRef idx="0">
+            <a:schemeClr val="accent1"/>
+          </a:effectRef>
+          <a:fontRef idx="minor">
+            <a:schemeClr val="lt1"/>
+          </a:fontRef>
+        </p:style>
+        <p:txBody>
+          <a:bodyPr lIns="0" tIns="0" rIns="0" bIns="0" rtlCol="0" anchor="ctr"/>
+          <a:lstStyle/>
+          <a:p>
+            <a:r>
+              <a:rPr lang="en-US" sz="1200" dirty="0" smtClean="0">
+                <a:solidFill>
+                  <a:schemeClr val="tx1"/>
+                </a:solidFill>
+              </a:rPr>
+              <a:t>Backup everything!</a:t>
+            </a:r>
+            <a:endParaRPr lang="en-US" sz="1200" dirty="0">
+              <a:solidFill>
+                <a:schemeClr val="tx1"/>
+              </a:solidFill>
+            </a:endParaRPr>
+          </a:p>
+        </p:txBody>
+      </p:sp>
     </p:spTree>
     <p:extLst>
       <p:ext uri="{BB962C8B-B14F-4D97-AF65-F5344CB8AC3E}">
-        <p14:creationId xmlns:p14="http://schemas.microsoft.com/office/powerpoint/2010/main" val="1944788207"/>
+        <p14:creationId xmlns:p14="http://schemas.microsoft.com/office/powerpoint/2010/main" val="459573298"/>
       </p:ext>
     </p:extLst>
   </p:cSld>
@@ -6573,6 +6902,114 @@
           </a:p>
         </p:txBody>
       </p:sp>
+      <p:pic>
+        <p:nvPicPr>
+          <p:cNvPr id="2050" name="Picture 2"/>
+          <p:cNvPicPr>
+            <a:picLocks noChangeAspect="1" noChangeArrowheads="1"/>
+          </p:cNvPicPr>
+          <p:nvPr/>
+        </p:nvPicPr>
+        <p:blipFill>
+          <a:blip r:embed="rId5" cstate="print">
+            <a:extLst>
+              <a:ext uri="{28A0092B-C50C-407E-A947-70E740481C1C}">
+                <a14:useLocalDpi xmlns:a14="http://schemas.microsoft.com/office/drawing/2010/main" val="0"/>
+              </a:ext>
+            </a:extLst>
+          </a:blip>
+          <a:srcRect/>
+          <a:stretch>
+            <a:fillRect/>
+          </a:stretch>
+        </p:blipFill>
+        <p:spPr bwMode="auto">
+          <a:xfrm>
+            <a:off x="7442712" y="5257800"/>
+            <a:ext cx="1396488" cy="1285875"/>
+          </a:xfrm>
+          <a:prstGeom prst="rect">
+            <a:avLst/>
+          </a:prstGeom>
+          <a:noFill/>
+          <a:ln>
+            <a:noFill/>
+          </a:ln>
+          <a:extLst>
+            <a:ext uri="{909E8E84-426E-40DD-AFC4-6F175D3DCCD1}">
+              <a14:hiddenFill xmlns:a14="http://schemas.microsoft.com/office/drawing/2010/main">
+                <a:solidFill>
+                  <a:schemeClr val="accent1"/>
+                </a:solidFill>
+              </a14:hiddenFill>
+            </a:ext>
+            <a:ext uri="{91240B29-F687-4F45-9708-019B960494DF}">
+              <a14:hiddenLine xmlns:a14="http://schemas.microsoft.com/office/drawing/2010/main" w="9525">
+                <a:solidFill>
+                  <a:schemeClr val="tx1"/>
+                </a:solidFill>
+                <a:miter lim="800000"/>
+                <a:headEnd/>
+                <a:tailEnd/>
+              </a14:hiddenLine>
+            </a:ext>
+          </a:extLst>
+        </p:spPr>
+      </p:pic>
+      <p:pic>
+        <p:nvPicPr>
+          <p:cNvPr id="2051" name="Picture 3"/>
+          <p:cNvPicPr>
+            <a:picLocks noChangeAspect="1" noChangeArrowheads="1"/>
+          </p:cNvPicPr>
+          <p:nvPr/>
+        </p:nvPicPr>
+        <p:blipFill>
+          <a:blip r:embed="rId6" cstate="print">
+            <a:extLst>
+              <a:ext uri="{28A0092B-C50C-407E-A947-70E740481C1C}">
+                <a14:useLocalDpi xmlns:a14="http://schemas.microsoft.com/office/drawing/2010/main" val="0"/>
+              </a:ext>
+            </a:extLst>
+          </a:blip>
+          <a:srcRect/>
+          <a:stretch>
+            <a:fillRect/>
+          </a:stretch>
+        </p:blipFill>
+        <p:spPr bwMode="auto">
+          <a:xfrm>
+            <a:off x="5715000" y="5257799"/>
+            <a:ext cx="1426240" cy="1306407"/>
+          </a:xfrm>
+          <a:prstGeom prst="rect">
+            <a:avLst/>
+          </a:prstGeom>
+          <a:noFill/>
+          <a:ln>
+            <a:noFill/>
+          </a:ln>
+          <a:extLst>
+            <a:ext uri="{909E8E84-426E-40DD-AFC4-6F175D3DCCD1}">
+              <a14:hiddenFill xmlns:a14="http://schemas.microsoft.com/office/drawing/2010/main">
+                <a:solidFill>
+                  <a:schemeClr val="accent1"/>
+                </a:solidFill>
+              </a14:hiddenFill>
+            </a:ext>
+            <a:ext uri="{91240B29-F687-4F45-9708-019B960494DF}">
+              <a14:hiddenLine xmlns:a14="http://schemas.microsoft.com/office/drawing/2010/main" w="9525">
+                <a:solidFill>
+                  <a:schemeClr val="tx1"/>
+                </a:solidFill>
+                <a:miter lim="800000"/>
+                <a:headEnd/>
+                <a:tailEnd/>
+              </a14:hiddenLine>
+            </a:ext>
+          </a:extLst>
+        </p:spPr>
+      </p:pic>
     </p:spTree>
     <p:extLst>
       <p:ext uri="{BB962C8B-B14F-4D97-AF65-F5344CB8AC3E}">
@@ -6612,7 +7049,7 @@
       </p:grpSpPr>
       <p:pic>
         <p:nvPicPr>
-          <p:cNvPr id="5122" name="Picture 2" descr="C:\Users\Pedro\Desktop\Z_DRIVE_Pedro\2 Music - Controllers\0_MAPS_Traktor\DDJ Pioneer\v6.5.1 - DDJ-1000 - TP3_TP2 BOME\Support files\Source files\Installation\Traktor\2 - seelct audio devices as well.JPG"/>
+          <p:cNvPr id="4098" name="Picture 2" descr="C:\Users\Pedro\Desktop\Z_DRIVE_Pedro\2 Music - Controllers\0_MAPS_Traktor\DDJ Pioneer\v6.5.1 - DDJ-1000 - TP3_TP2 BOME\Support files\Source files\Installation\Traktor\1 - instll traktor mapping.JPG"/>
           <p:cNvPicPr>
             <a:picLocks noChangeAspect="1" noChangeArrowheads="1"/>
           </p:cNvPicPr>
@@ -6633,8 +7070,8 @@
         </p:blipFill>
         <p:spPr bwMode="auto">
           <a:xfrm>
-            <a:off x="1443037" y="916161"/>
-            <a:ext cx="6786563" cy="5600295"/>
+            <a:off x="1171575" y="601385"/>
+            <a:ext cx="7162800" cy="5981731"/>
           </a:xfrm>
           <a:prstGeom prst="rect">
             <a:avLst/>
@@ -6660,7 +7097,7 @@
         <p:spPr>
           <a:xfrm>
             <a:off x="152400" y="111145"/>
-            <a:ext cx="4444037" cy="461665"/>
+            <a:ext cx="3519105" cy="461665"/>
           </a:xfrm>
           <a:prstGeom prst="rect">
             <a:avLst/>
@@ -6675,11 +7112,7 @@
           <a:p>
             <a:r>
               <a:rPr lang="en-US" sz="2400" i="1" u="sng" dirty="0" smtClean="0"/>
-              <a:t>TRAKTOR: add audio device </a:t>
-            </a:r>
-            <a:r>
-              <a:rPr lang="en-US" sz="2400" i="1" u="sng" dirty="0" err="1" smtClean="0"/>
-              <a:t>config</a:t>
+              <a:t>TRAKTOR: import mapping</a:t>
             </a:r>
             <a:endParaRPr lang="en-US" sz="2400" i="1" u="sng" dirty="0"/>
           </a:p>
@@ -6693,8 +7126,8 @@
         </p:nvSpPr>
         <p:spPr>
           <a:xfrm>
-            <a:off x="5714999" y="3657600"/>
-            <a:ext cx="1549219" cy="342900"/>
+            <a:off x="7010400" y="895350"/>
+            <a:ext cx="304800" cy="342900"/>
           </a:xfrm>
           <a:prstGeom prst="ellipse">
             <a:avLst/>
@@ -6733,31 +7166,22 @@
       </p:sp>
       <p:sp>
         <p:nvSpPr>
-          <p:cNvPr id="10" name="Line Callout 1 (Accent Bar) 9"/>
+          <p:cNvPr id="15" name="Oval 14"/>
           <p:cNvSpPr/>
           <p:nvPr/>
         </p:nvSpPr>
         <p:spPr>
           <a:xfrm>
-            <a:off x="7467600" y="2952750"/>
-            <a:ext cx="1219200" cy="457200"/>
-          </a:xfrm>
-          <a:prstGeom prst="accentCallout1">
-            <a:avLst>
-              <a:gd name="adj1" fmla="val 45417"/>
-              <a:gd name="adj2" fmla="val -2669"/>
-              <a:gd name="adj3" fmla="val 150146"/>
-              <a:gd name="adj4" fmla="val -76294"/>
-            </a:avLst>
-          </a:prstGeom>
-          <a:solidFill>
-            <a:schemeClr val="bg1">
-              <a:lumMod val="85000"/>
-            </a:schemeClr>
-          </a:solidFill>
-          <a:ln>
+            <a:off x="1854018" y="5457825"/>
+            <a:ext cx="736782" cy="304800"/>
+          </a:xfrm>
+          <a:prstGeom prst="ellipse">
+            <a:avLst/>
+          </a:prstGeom>
+          <a:noFill/>
+          <a:ln w="44450">
             <a:solidFill>
-              <a:schemeClr val="accent2"/>
+              <a:srgbClr val="C00000"/>
             </a:solidFill>
           </a:ln>
         </p:spPr>
@@ -6778,29 +7202,64 @@
           </a:fontRef>
         </p:style>
         <p:txBody>
-          <a:bodyPr lIns="0" tIns="0" rIns="0" bIns="0" rtlCol="0" anchor="ctr"/>
-          <a:lstStyle/>
-          <a:p>
-            <a:r>
-              <a:rPr lang="en-US" sz="1200" dirty="0" smtClean="0">
-                <a:solidFill>
-                  <a:schemeClr val="tx1"/>
-                </a:solidFill>
-              </a:rPr>
-              <a:t>Please include this one</a:t>
-            </a:r>
-            <a:endParaRPr lang="en-US" sz="1200" dirty="0">
-              <a:solidFill>
-                <a:schemeClr val="tx1"/>
-              </a:solidFill>
-            </a:endParaRPr>
+          <a:bodyPr rtlCol="0" anchor="ctr"/>
+          <a:lstStyle/>
+          <a:p>
+            <a:pPr algn="ctr"/>
+            <a:endParaRPr lang="en-US"/>
+          </a:p>
+        </p:txBody>
+      </p:sp>
+      <p:sp>
+        <p:nvSpPr>
+          <p:cNvPr id="10" name="Oval 9"/>
+          <p:cNvSpPr/>
+          <p:nvPr/>
+        </p:nvSpPr>
+        <p:spPr>
+          <a:xfrm>
+            <a:off x="5486400" y="4495800"/>
+            <a:ext cx="1600200" cy="304800"/>
+          </a:xfrm>
+          <a:prstGeom prst="ellipse">
+            <a:avLst/>
+          </a:prstGeom>
+          <a:noFill/>
+          <a:ln w="44450">
+            <a:solidFill>
+              <a:srgbClr val="C00000"/>
+            </a:solidFill>
+          </a:ln>
+        </p:spPr>
+        <p:style>
+          <a:lnRef idx="2">
+            <a:schemeClr val="accent1">
+              <a:shade val="50000"/>
+            </a:schemeClr>
+          </a:lnRef>
+          <a:fillRef idx="1">
+            <a:schemeClr val="accent1"/>
+          </a:fillRef>
+          <a:effectRef idx="0">
+            <a:schemeClr val="accent1"/>
+          </a:effectRef>
+          <a:fontRef idx="minor">
+            <a:schemeClr val="lt1"/>
+          </a:fontRef>
+        </p:style>
+        <p:txBody>
+          <a:bodyPr rtlCol="0" anchor="ctr"/>
+          <a:lstStyle/>
+          <a:p>
+            <a:pPr algn="ctr"/>
+            <a:endParaRPr lang="en-US"/>
           </a:p>
         </p:txBody>
       </p:sp>
     </p:spTree>
     <p:extLst>
       <p:ext uri="{BB962C8B-B14F-4D97-AF65-F5344CB8AC3E}">
-        <p14:creationId xmlns:p14="http://schemas.microsoft.com/office/powerpoint/2010/main" val="3028467603"/>
+        <p14:creationId xmlns:p14="http://schemas.microsoft.com/office/powerpoint/2010/main" val="1944788207"/>
       </p:ext>
     </p:extLst>
   </p:cSld>
@@ -6829,7 +7288,7 @@
       </p:grpSpPr>
       <p:pic>
         <p:nvPicPr>
-          <p:cNvPr id="4098" name="Picture 2" descr="C:\Users\Pedro\Desktop\Z_DRIVE_Pedro\2 Music - Controllers\0_MAPS_Traktor\DDJ Pioneer\v6.5.1 - DDJ-1000 - TP3_TP2 BOME\Support files\Source files\Installation\Traktor\1 - instll traktor mapping.JPG"/>
+          <p:cNvPr id="5122" name="Picture 2" descr="C:\Users\Pedro\Desktop\Z_DRIVE_Pedro\2 Music - Controllers\0_MAPS_Traktor\DDJ Pioneer\v6.5.1 - DDJ-1000 - TP3_TP2 BOME\Support files\Source files\Installation\Traktor\2 - seelct audio devices as well.JPG"/>
           <p:cNvPicPr>
             <a:picLocks noChangeAspect="1" noChangeArrowheads="1"/>
           </p:cNvPicPr>
@@ -6850,8 +7309,8 @@
         </p:blipFill>
         <p:spPr bwMode="auto">
           <a:xfrm>
-            <a:off x="1171575" y="601385"/>
-            <a:ext cx="7162800" cy="5981731"/>
+            <a:off x="1443037" y="916161"/>
+            <a:ext cx="6786563" cy="5600295"/>
           </a:xfrm>
           <a:prstGeom prst="rect">
             <a:avLst/>
@@ -6877,7 +7336,7 @@
         <p:spPr>
           <a:xfrm>
             <a:off x="152400" y="111145"/>
-            <a:ext cx="5276637" cy="461665"/>
+            <a:ext cx="4504951" cy="461665"/>
           </a:xfrm>
           <a:prstGeom prst="rect">
             <a:avLst/>
@@ -6892,7 +7351,11 @@
           <a:p>
             <a:r>
               <a:rPr lang="en-US" sz="2400" i="1" u="sng" dirty="0" smtClean="0"/>
-              <a:t>TRAKTOR: import mapping (second time)</a:t>
+              <a:t>TRAKTOR: click audio device </a:t>
+            </a:r>
+            <a:r>
+              <a:rPr lang="en-US" sz="2400" i="1" u="sng" dirty="0" err="1" smtClean="0"/>
+              <a:t>config</a:t>
             </a:r>
             <a:endParaRPr lang="en-US" sz="2400" i="1" u="sng" dirty="0"/>
           </a:p>
@@ -6906,8 +7369,8 @@
         </p:nvSpPr>
         <p:spPr>
           <a:xfrm>
-            <a:off x="7010400" y="895350"/>
-            <a:ext cx="304800" cy="342900"/>
+            <a:off x="5714999" y="3657600"/>
+            <a:ext cx="1549219" cy="342900"/>
           </a:xfrm>
           <a:prstGeom prst="ellipse">
             <a:avLst/>
@@ -6946,22 +7409,31 @@
       </p:sp>
       <p:sp>
         <p:nvSpPr>
-          <p:cNvPr id="15" name="Oval 14"/>
+          <p:cNvPr id="10" name="Line Callout 1 (Accent Bar) 9"/>
           <p:cNvSpPr/>
           <p:nvPr/>
         </p:nvSpPr>
         <p:spPr>
           <a:xfrm>
-            <a:off x="1854018" y="5457825"/>
-            <a:ext cx="736782" cy="304800"/>
-          </a:xfrm>
-          <a:prstGeom prst="ellipse">
-            <a:avLst/>
-          </a:prstGeom>
-          <a:noFill/>
-          <a:ln w="44450">
+            <a:off x="7467600" y="2952750"/>
+            <a:ext cx="1219200" cy="457200"/>
+          </a:xfrm>
+          <a:prstGeom prst="accentCallout1">
+            <a:avLst>
+              <a:gd name="adj1" fmla="val 45417"/>
+              <a:gd name="adj2" fmla="val -2669"/>
+              <a:gd name="adj3" fmla="val 150146"/>
+              <a:gd name="adj4" fmla="val -76294"/>
+            </a:avLst>
+          </a:prstGeom>
+          <a:solidFill>
+            <a:schemeClr val="bg1">
+              <a:lumMod val="85000"/>
+            </a:schemeClr>
+          </a:solidFill>
+          <a:ln>
             <a:solidFill>
-              <a:srgbClr val="C00000"/>
+              <a:schemeClr val="accent2"/>
             </a:solidFill>
           </a:ln>
         </p:spPr>
@@ -6982,64 +7454,29 @@
           </a:fontRef>
         </p:style>
         <p:txBody>
-          <a:bodyPr rtlCol="0" anchor="ctr"/>
-          <a:lstStyle/>
-          <a:p>
-            <a:pPr algn="ctr"/>
-            <a:endParaRPr lang="en-US"/>
-          </a:p>
-        </p:txBody>
-      </p:sp>
-      <p:sp>
-        <p:nvSpPr>
-          <p:cNvPr id="10" name="Oval 9"/>
-          <p:cNvSpPr/>
-          <p:nvPr/>
-        </p:nvSpPr>
-        <p:spPr>
-          <a:xfrm>
-            <a:off x="5486400" y="4495800"/>
-            <a:ext cx="1600200" cy="304800"/>
-          </a:xfrm>
-          <a:prstGeom prst="ellipse">
-            <a:avLst/>
-          </a:prstGeom>
-          <a:noFill/>
-          <a:ln w="44450">
-            <a:solidFill>
-              <a:srgbClr val="C00000"/>
-            </a:solidFill>
-          </a:ln>
-        </p:spPr>
-        <p:style>
-          <a:lnRef idx="2">
-            <a:schemeClr val="accent1">
-              <a:shade val="50000"/>
-            </a:schemeClr>
-          </a:lnRef>
-          <a:fillRef idx="1">
-            <a:schemeClr val="accent1"/>
-          </a:fillRef>
-          <a:effectRef idx="0">
-            <a:schemeClr val="accent1"/>
-          </a:effectRef>
-          <a:fontRef idx="minor">
-            <a:schemeClr val="lt1"/>
-          </a:fontRef>
-        </p:style>
-        <p:txBody>
-          <a:bodyPr rtlCol="0" anchor="ctr"/>
-          <a:lstStyle/>
-          <a:p>
-            <a:pPr algn="ctr"/>
-            <a:endParaRPr lang="en-US"/>
+          <a:bodyPr lIns="0" tIns="0" rIns="0" bIns="0" rtlCol="0" anchor="ctr"/>
+          <a:lstStyle/>
+          <a:p>
+            <a:r>
+              <a:rPr lang="en-US" sz="1200" dirty="0" smtClean="0">
+                <a:solidFill>
+                  <a:schemeClr val="tx1"/>
+                </a:solidFill>
+              </a:rPr>
+              <a:t>Please include this one as well</a:t>
+            </a:r>
+            <a:endParaRPr lang="en-US" sz="1200" dirty="0">
+              <a:solidFill>
+                <a:schemeClr val="tx1"/>
+              </a:solidFill>
+            </a:endParaRPr>
           </a:p>
         </p:txBody>
       </p:sp>
     </p:spTree>
     <p:extLst>
       <p:ext uri="{BB962C8B-B14F-4D97-AF65-F5344CB8AC3E}">
-        <p14:creationId xmlns:p14="http://schemas.microsoft.com/office/powerpoint/2010/main" val="3082533567"/>
+        <p14:creationId xmlns:p14="http://schemas.microsoft.com/office/powerpoint/2010/main" val="3028467603"/>
       </p:ext>
     </p:extLst>
   </p:cSld>
@@ -7068,7 +7505,7 @@
       </p:grpSpPr>
       <p:pic>
         <p:nvPicPr>
-          <p:cNvPr id="5122" name="Picture 2" descr="C:\Users\Pedro\Desktop\Z_DRIVE_Pedro\2 Music - Controllers\0_MAPS_Traktor\DDJ Pioneer\v6.5.1 - DDJ-1000 - TP3_TP2 BOME\Support files\Source files\Installation\Traktor\2 - seelct audio devices as well.JPG"/>
+          <p:cNvPr id="4098" name="Picture 2" descr="C:\Users\Pedro\Desktop\Z_DRIVE_Pedro\2 Music - Controllers\0_MAPS_Traktor\DDJ Pioneer\v6.5.1 - DDJ-1000 - TP3_TP2 BOME\Support files\Source files\Installation\Traktor\1 - instll traktor mapping.JPG"/>
           <p:cNvPicPr>
             <a:picLocks noChangeAspect="1" noChangeArrowheads="1"/>
           </p:cNvPicPr>
@@ -7089,8 +7526,8 @@
         </p:blipFill>
         <p:spPr bwMode="auto">
           <a:xfrm>
-            <a:off x="1443037" y="916161"/>
-            <a:ext cx="6786563" cy="5600295"/>
+            <a:off x="1171575" y="601385"/>
+            <a:ext cx="7162800" cy="5981731"/>
           </a:xfrm>
           <a:prstGeom prst="rect">
             <a:avLst/>
@@ -7116,7 +7553,7 @@
         <p:spPr>
           <a:xfrm>
             <a:off x="152400" y="111145"/>
-            <a:ext cx="6201569" cy="461665"/>
+            <a:ext cx="5276637" cy="461665"/>
           </a:xfrm>
           <a:prstGeom prst="rect">
             <a:avLst/>
@@ -7131,16 +7568,9 @@
           <a:p>
             <a:r>
               <a:rPr lang="en-US" sz="2400" i="1" u="sng" dirty="0" smtClean="0"/>
-              <a:t>TRAKTOR: add audio device </a:t>
-            </a:r>
-            <a:r>
-              <a:rPr lang="en-US" sz="2400" i="1" u="sng" dirty="0" err="1" smtClean="0"/>
-              <a:t>config</a:t>
-            </a:r>
-            <a:r>
-              <a:rPr lang="en-US" sz="2400" i="1" u="sng" dirty="0"/>
-              <a:t> (second time)</a:t>
-            </a:r>
+              <a:t>TRAKTOR: import mapping (second time)</a:t>
+            </a:r>
+            <a:endParaRPr lang="en-US" sz="2400" i="1" u="sng" dirty="0"/>
           </a:p>
         </p:txBody>
       </p:sp>
@@ -7152,8 +7582,8 @@
         </p:nvSpPr>
         <p:spPr>
           <a:xfrm>
-            <a:off x="5714999" y="3657600"/>
-            <a:ext cx="1549219" cy="342900"/>
+            <a:off x="7010400" y="895350"/>
+            <a:ext cx="304800" cy="342900"/>
           </a:xfrm>
           <a:prstGeom prst="ellipse">
             <a:avLst/>
@@ -7192,31 +7622,22 @@
       </p:sp>
       <p:sp>
         <p:nvSpPr>
-          <p:cNvPr id="10" name="Line Callout 1 (Accent Bar) 9"/>
+          <p:cNvPr id="15" name="Oval 14"/>
           <p:cNvSpPr/>
           <p:nvPr/>
         </p:nvSpPr>
         <p:spPr>
           <a:xfrm>
-            <a:off x="7467600" y="2952750"/>
-            <a:ext cx="1219200" cy="457200"/>
-          </a:xfrm>
-          <a:prstGeom prst="accentCallout1">
-            <a:avLst>
-              <a:gd name="adj1" fmla="val 45417"/>
-              <a:gd name="adj2" fmla="val -2669"/>
-              <a:gd name="adj3" fmla="val 150146"/>
-              <a:gd name="adj4" fmla="val -76294"/>
-            </a:avLst>
-          </a:prstGeom>
-          <a:solidFill>
-            <a:schemeClr val="bg1">
-              <a:lumMod val="85000"/>
-            </a:schemeClr>
-          </a:solidFill>
-          <a:ln>
+            <a:off x="1854018" y="5457825"/>
+            <a:ext cx="736782" cy="304800"/>
+          </a:xfrm>
+          <a:prstGeom prst="ellipse">
+            <a:avLst/>
+          </a:prstGeom>
+          <a:noFill/>
+          <a:ln w="44450">
             <a:solidFill>
-              <a:schemeClr val="accent2"/>
+              <a:srgbClr val="C00000"/>
             </a:solidFill>
           </a:ln>
         </p:spPr>
@@ -7237,29 +7658,64 @@
           </a:fontRef>
         </p:style>
         <p:txBody>
-          <a:bodyPr lIns="0" tIns="0" rIns="0" bIns="0" rtlCol="0" anchor="ctr"/>
-          <a:lstStyle/>
-          <a:p>
-            <a:r>
-              <a:rPr lang="en-US" sz="1200" dirty="0" smtClean="0">
-                <a:solidFill>
-                  <a:schemeClr val="tx1"/>
-                </a:solidFill>
-              </a:rPr>
-              <a:t>Please include this one</a:t>
-            </a:r>
-            <a:endParaRPr lang="en-US" sz="1200" dirty="0">
-              <a:solidFill>
-                <a:schemeClr val="tx1"/>
-              </a:solidFill>
-            </a:endParaRPr>
+          <a:bodyPr rtlCol="0" anchor="ctr"/>
+          <a:lstStyle/>
+          <a:p>
+            <a:pPr algn="ctr"/>
+            <a:endParaRPr lang="en-US"/>
+          </a:p>
+        </p:txBody>
+      </p:sp>
+      <p:sp>
+        <p:nvSpPr>
+          <p:cNvPr id="10" name="Oval 9"/>
+          <p:cNvSpPr/>
+          <p:nvPr/>
+        </p:nvSpPr>
+        <p:spPr>
+          <a:xfrm>
+            <a:off x="5486400" y="4495800"/>
+            <a:ext cx="1600200" cy="304800"/>
+          </a:xfrm>
+          <a:prstGeom prst="ellipse">
+            <a:avLst/>
+          </a:prstGeom>
+          <a:noFill/>
+          <a:ln w="44450">
+            <a:solidFill>
+              <a:srgbClr val="C00000"/>
+            </a:solidFill>
+          </a:ln>
+        </p:spPr>
+        <p:style>
+          <a:lnRef idx="2">
+            <a:schemeClr val="accent1">
+              <a:shade val="50000"/>
+            </a:schemeClr>
+          </a:lnRef>
+          <a:fillRef idx="1">
+            <a:schemeClr val="accent1"/>
+          </a:fillRef>
+          <a:effectRef idx="0">
+            <a:schemeClr val="accent1"/>
+          </a:effectRef>
+          <a:fontRef idx="minor">
+            <a:schemeClr val="lt1"/>
+          </a:fontRef>
+        </p:style>
+        <p:txBody>
+          <a:bodyPr rtlCol="0" anchor="ctr"/>
+          <a:lstStyle/>
+          <a:p>
+            <a:pPr algn="ctr"/>
+            <a:endParaRPr lang="en-US"/>
           </a:p>
         </p:txBody>
       </p:sp>
     </p:spTree>
     <p:extLst>
       <p:ext uri="{BB962C8B-B14F-4D97-AF65-F5344CB8AC3E}">
-        <p14:creationId xmlns:p14="http://schemas.microsoft.com/office/powerpoint/2010/main" val="2247354315"/>
+        <p14:creationId xmlns:p14="http://schemas.microsoft.com/office/powerpoint/2010/main" val="3082533567"/>
       </p:ext>
     </p:extLst>
   </p:cSld>
@@ -7381,10 +7837,10 @@
         </p:nvGrpSpPr>
         <p:grpSpPr>
           <a:xfrm>
-            <a:off x="228600" y="304800"/>
-            <a:ext cx="8643551" cy="5724644"/>
+            <a:off x="61865" y="151179"/>
+            <a:ext cx="9067800" cy="6463308"/>
             <a:chOff x="304800" y="457200"/>
-            <a:chExt cx="8643551" cy="5724644"/>
+            <a:chExt cx="8839200" cy="6463308"/>
           </a:xfrm>
         </p:grpSpPr>
         <p:sp>
@@ -7396,7 +7852,7 @@
           <p:spPr>
             <a:xfrm>
               <a:off x="304800" y="457200"/>
-              <a:ext cx="8534400" cy="5724644"/>
+              <a:ext cx="8839200" cy="6463308"/>
             </a:xfrm>
             <a:prstGeom prst="rect">
               <a:avLst/>
@@ -7434,7 +7890,7 @@
               </a:r>
               <a:r>
                 <a:rPr lang="en-US" i="1" dirty="0" smtClean="0"/>
-                <a:t>a known </a:t>
+                <a:t>another </a:t>
               </a:r>
               <a:r>
                 <a:rPr lang="en-US" i="1" dirty="0" err="1" smtClean="0"/>
@@ -7495,6 +7951,43 @@
               </a:pPr>
               <a:r>
                 <a:rPr lang="en-US" dirty="0"/>
+                <a:t>Confirm the </a:t>
+              </a:r>
+              <a:r>
+                <a:rPr lang="en-US" dirty="0" smtClean="0"/>
+                <a:t>Output routing</a:t>
+              </a:r>
+              <a:endParaRPr lang="en-US" dirty="0"/>
+            </a:p>
+            <a:p>
+              <a:pPr marL="1257300" lvl="2" indent="-342900">
+                <a:buFont typeface="+mj-lt"/>
+                <a:buAutoNum type="arabicPeriod"/>
+              </a:pPr>
+              <a:r>
+                <a:rPr lang="en-US" dirty="0"/>
+                <a:t>Method:  Settings ; </a:t>
+              </a:r>
+              <a:r>
+                <a:rPr lang="en-US" dirty="0" smtClean="0"/>
+                <a:t>output routing; confirm “internal”; confirm “3 / 4 / 1 / 2”</a:t>
+              </a:r>
+              <a:endParaRPr lang="en-US" dirty="0"/>
+            </a:p>
+            <a:p>
+              <a:pPr marL="800100" lvl="1" indent="-342900">
+                <a:buFont typeface="+mj-lt"/>
+                <a:buAutoNum type="arabicPeriod"/>
+              </a:pPr>
+              <a:endParaRPr lang="en-US" dirty="0" smtClean="0"/>
+            </a:p>
+            <a:p>
+              <a:pPr marL="800100" lvl="1" indent="-342900">
+                <a:buFont typeface="+mj-lt"/>
+                <a:buAutoNum type="arabicPeriod"/>
+              </a:pPr>
+              <a:r>
+                <a:rPr lang="en-US" dirty="0"/>
                 <a:t>Confirm that all </a:t>
               </a:r>
               <a:r>
@@ -7507,7 +8000,15 @@
               </a:r>
               <a:r>
                 <a:rPr lang="en-US" dirty="0" smtClean="0"/>
-                <a:t>have exactly “BMT1”</a:t>
+                <a:t>have exactly “</a:t>
+              </a:r>
+              <a:r>
+                <a:rPr lang="en-US" dirty="0" err="1" smtClean="0"/>
+                <a:t>Bome</a:t>
+              </a:r>
+              <a:r>
+                <a:rPr lang="en-US" dirty="0" smtClean="0"/>
+                <a:t> Midi Translator1”</a:t>
               </a:r>
               <a:endParaRPr lang="en-US" dirty="0"/>
             </a:p>
@@ -7545,7 +8046,15 @@
               </a:r>
               <a:r>
                 <a:rPr lang="en-US" sz="2000" b="1" i="1" u="sng" dirty="0"/>
-                <a:t>NOT SET DDJ-1000 in the controller manager</a:t>
+                <a:t>NOT </a:t>
+              </a:r>
+              <a:r>
+                <a:rPr lang="en-US" sz="2000" b="1" i="1" u="sng" dirty="0" smtClean="0"/>
+                <a:t>CHANGE TO DDJ-1000 </a:t>
+              </a:r>
+              <a:r>
+                <a:rPr lang="en-US" sz="2000" b="1" i="1" u="sng" dirty="0"/>
+                <a:t>in the controller manager</a:t>
               </a:r>
               <a:r>
                 <a:rPr lang="en-US" sz="2000" b="1" i="1" u="sng" dirty="0" smtClean="0"/>
@@ -7559,23 +8068,16 @@
               </a:pPr>
               <a:r>
                 <a:rPr lang="en-US" sz="2000" b="1" i="1" u="sng" dirty="0" smtClean="0"/>
-                <a:t>DO NOT FORGET TO CONFIRM ALL </a:t>
+                <a:t>DO NOT FORGET TO CONFIRM </a:t>
+              </a:r>
+              <a:r>
+                <a:rPr lang="en-US" sz="3200" b="1" i="1" u="sng" dirty="0" smtClean="0"/>
+                <a:t>ALL </a:t>
               </a:r>
               <a:r>
                 <a:rPr lang="en-US" sz="2000" b="1" i="1" u="sng" dirty="0" smtClean="0"/>
-                <a:t>6x </a:t>
+                <a:t>6x PAGES!</a:t>
               </a:r>
-              <a:r>
-                <a:rPr lang="en-US" sz="2000" b="1" i="1" u="sng" dirty="0" smtClean="0"/>
-                <a:t>PAGES</a:t>
-              </a:r>
-            </a:p>
-            <a:p>
-              <a:pPr marL="800100" lvl="1" indent="-342900">
-                <a:buFont typeface="+mj-lt"/>
-                <a:buAutoNum type="arabicPeriod"/>
-              </a:pPr>
-              <a:endParaRPr lang="en-US" dirty="0" smtClean="0"/>
             </a:p>
             <a:p>
               <a:pPr marL="800100" lvl="1" indent="-342900">
@@ -7672,8 +8174,8 @@
           </p:nvSpPr>
           <p:spPr>
             <a:xfrm>
-              <a:off x="7271951" y="2812005"/>
-              <a:ext cx="1676400" cy="507517"/>
+              <a:off x="7746672" y="3689526"/>
+              <a:ext cx="1397327" cy="507517"/>
             </a:xfrm>
             <a:prstGeom prst="leftArrow">
               <a:avLst>
@@ -7715,7 +8217,7 @@
                     <a:schemeClr val="tx1"/>
                   </a:solidFill>
                 </a:rPr>
-                <a:t>#1 problem!!</a:t>
+                <a:t>Beware #1!</a:t>
               </a:r>
               <a:endParaRPr lang="en-US" dirty="0">
                 <a:solidFill>
@@ -7733,8 +8235,8 @@
           </p:nvSpPr>
           <p:spPr>
             <a:xfrm>
-              <a:off x="7271951" y="3314700"/>
-              <a:ext cx="1676400" cy="533400"/>
+              <a:off x="7746673" y="4039821"/>
+              <a:ext cx="1397326" cy="533400"/>
             </a:xfrm>
             <a:prstGeom prst="leftArrow">
               <a:avLst>
@@ -7776,7 +8278,7 @@
                     <a:schemeClr val="tx1"/>
                   </a:solidFill>
                 </a:rPr>
-                <a:t>#2 problem!!</a:t>
+                <a:t>Beware #2!</a:t>
               </a:r>
               <a:endParaRPr lang="en-US" dirty="0">
                 <a:solidFill>
@@ -8010,39 +8512,9 @@
           <a:chExt cx="0" cy="0"/>
         </a:xfrm>
       </p:grpSpPr>
-      <p:sp>
-        <p:nvSpPr>
-          <p:cNvPr id="11" name="TextBox 10"/>
-          <p:cNvSpPr txBox="1"/>
-          <p:nvPr/>
-        </p:nvSpPr>
-        <p:spPr>
-          <a:xfrm>
-            <a:off x="152400" y="111145"/>
-            <a:ext cx="3669787" cy="461665"/>
-          </a:xfrm>
-          <a:prstGeom prst="rect">
-            <a:avLst/>
-          </a:prstGeom>
-          <a:noFill/>
-        </p:spPr>
-        <p:txBody>
-          <a:bodyPr wrap="none" rtlCol="0">
-            <a:spAutoFit/>
-          </a:bodyPr>
-          <a:lstStyle/>
-          <a:p>
-            <a:r>
-              <a:rPr lang="en-US" sz="2400" i="1" u="sng" dirty="0" smtClean="0"/>
-              <a:t>TRAKTOR:  MIDI via “BMT1”</a:t>
-            </a:r>
-            <a:endParaRPr lang="en-US" sz="2400" i="1" u="sng" dirty="0"/>
-          </a:p>
-        </p:txBody>
-      </p:sp>
       <p:pic>
         <p:nvPicPr>
-          <p:cNvPr id="5" name="Picture 7" descr="C:\Users\Pedro\Desktop\Z_DRIVE_Pedro\2 Music - Controllers\0_MAPS_Traktor\DDJ Pioneer\v6.5.0 - DDJ-1000 - TP3_TP2 BOME\Support files\Source files\Installation\6 - TRAKTOR - controller manager devices.JPG"/>
+          <p:cNvPr id="3075" name="Picture 3"/>
           <p:cNvPicPr>
             <a:picLocks noChangeAspect="1" noChangeArrowheads="1"/>
           </p:cNvPicPr>
@@ -8063,24 +8535,67 @@
         </p:blipFill>
         <p:spPr bwMode="auto">
           <a:xfrm>
-            <a:off x="2246868" y="1310912"/>
-            <a:ext cx="4181323" cy="4715637"/>
+            <a:off x="3505200" y="990600"/>
+            <a:ext cx="4953000" cy="5367338"/>
           </a:xfrm>
           <a:prstGeom prst="rect">
             <a:avLst/>
           </a:prstGeom>
           <a:noFill/>
+          <a:ln>
+            <a:noFill/>
+          </a:ln>
           <a:extLst>
             <a:ext uri="{909E8E84-426E-40DD-AFC4-6F175D3DCCD1}">
               <a14:hiddenFill xmlns:a14="http://schemas.microsoft.com/office/drawing/2010/main">
                 <a:solidFill>
-                  <a:srgbClr val="FFFFFF"/>
+                  <a:schemeClr val="accent1"/>
                 </a:solidFill>
               </a14:hiddenFill>
             </a:ext>
+            <a:ext uri="{91240B29-F687-4F45-9708-019B960494DF}">
+              <a14:hiddenLine xmlns:a14="http://schemas.microsoft.com/office/drawing/2010/main" w="9525">
+                <a:solidFill>
+                  <a:schemeClr val="tx1"/>
+                </a:solidFill>
+                <a:miter lim="800000"/>
+                <a:headEnd/>
+                <a:tailEnd/>
+              </a14:hiddenLine>
+            </a:ext>
           </a:extLst>
         </p:spPr>
       </p:pic>
+      <p:sp>
+        <p:nvSpPr>
+          <p:cNvPr id="11" name="TextBox 10"/>
+          <p:cNvSpPr txBox="1"/>
+          <p:nvPr/>
+        </p:nvSpPr>
+        <p:spPr>
+          <a:xfrm>
+            <a:off x="152400" y="111145"/>
+            <a:ext cx="4096186" cy="461665"/>
+          </a:xfrm>
+          <a:prstGeom prst="rect">
+            <a:avLst/>
+          </a:prstGeom>
+          <a:noFill/>
+        </p:spPr>
+        <p:txBody>
+          <a:bodyPr wrap="none" rtlCol="0">
+            <a:spAutoFit/>
+          </a:bodyPr>
+          <a:lstStyle/>
+          <a:p>
+            <a:r>
+              <a:rPr lang="en-US" sz="2400" i="1" u="sng" dirty="0" smtClean="0"/>
+              <a:t>TRAKTOR: check output routing</a:t>
+            </a:r>
+            <a:endParaRPr lang="en-US" sz="2400" i="1" u="sng" dirty="0"/>
+          </a:p>
+        </p:txBody>
+      </p:sp>
       <p:sp>
         <p:nvSpPr>
           <p:cNvPr id="8" name="Oval 7"/>
@@ -8089,8 +8604,8 @@
         </p:nvSpPr>
         <p:spPr>
           <a:xfrm>
-            <a:off x="5201400" y="1730012"/>
-            <a:ext cx="1066800" cy="342900"/>
+            <a:off x="5835713" y="1371600"/>
+            <a:ext cx="798132" cy="381114"/>
           </a:xfrm>
           <a:prstGeom prst="ellipse">
             <a:avLst/>
@@ -8129,21 +8644,113 @@
       </p:sp>
       <p:sp>
         <p:nvSpPr>
-          <p:cNvPr id="14" name="Line Callout 1 (Accent Bar) 13"/>
+          <p:cNvPr id="9" name="Oval 8"/>
           <p:cNvSpPr/>
           <p:nvPr/>
         </p:nvSpPr>
         <p:spPr>
           <a:xfrm>
-            <a:off x="2133600" y="685800"/>
+            <a:off x="3733800" y="1371600"/>
+            <a:ext cx="1214510" cy="381114"/>
+          </a:xfrm>
+          <a:prstGeom prst="ellipse">
+            <a:avLst/>
+          </a:prstGeom>
+          <a:noFill/>
+          <a:ln w="44450">
+            <a:solidFill>
+              <a:srgbClr val="C00000"/>
+            </a:solidFill>
+          </a:ln>
+        </p:spPr>
+        <p:style>
+          <a:lnRef idx="2">
+            <a:schemeClr val="accent1">
+              <a:shade val="50000"/>
+            </a:schemeClr>
+          </a:lnRef>
+          <a:fillRef idx="1">
+            <a:schemeClr val="accent1"/>
+          </a:fillRef>
+          <a:effectRef idx="0">
+            <a:schemeClr val="accent1"/>
+          </a:effectRef>
+          <a:fontRef idx="minor">
+            <a:schemeClr val="lt1"/>
+          </a:fontRef>
+        </p:style>
+        <p:txBody>
+          <a:bodyPr rtlCol="0" anchor="ctr"/>
+          <a:lstStyle/>
+          <a:p>
+            <a:pPr algn="ctr"/>
+            <a:endParaRPr lang="en-US"/>
+          </a:p>
+        </p:txBody>
+      </p:sp>
+      <p:sp>
+        <p:nvSpPr>
+          <p:cNvPr id="10" name="Oval 9"/>
+          <p:cNvSpPr/>
+          <p:nvPr/>
+        </p:nvSpPr>
+        <p:spPr>
+          <a:xfrm>
+            <a:off x="5791200" y="1773952"/>
+            <a:ext cx="1219200" cy="1045447"/>
+          </a:xfrm>
+          <a:prstGeom prst="ellipse">
+            <a:avLst/>
+          </a:prstGeom>
+          <a:noFill/>
+          <a:ln w="44450">
+            <a:solidFill>
+              <a:srgbClr val="C00000"/>
+            </a:solidFill>
+          </a:ln>
+        </p:spPr>
+        <p:style>
+          <a:lnRef idx="2">
+            <a:schemeClr val="accent1">
+              <a:shade val="50000"/>
+            </a:schemeClr>
+          </a:lnRef>
+          <a:fillRef idx="1">
+            <a:schemeClr val="accent1"/>
+          </a:fillRef>
+          <a:effectRef idx="0">
+            <a:schemeClr val="accent1"/>
+          </a:effectRef>
+          <a:fontRef idx="minor">
+            <a:schemeClr val="lt1"/>
+          </a:fontRef>
+        </p:style>
+        <p:txBody>
+          <a:bodyPr rtlCol="0" anchor="ctr"/>
+          <a:lstStyle/>
+          <a:p>
+            <a:pPr algn="ctr"/>
+            <a:endParaRPr lang="en-US"/>
+          </a:p>
+        </p:txBody>
+      </p:sp>
+      <p:sp>
+        <p:nvSpPr>
+          <p:cNvPr id="12" name="Line Callout 1 (Accent Bar) 11"/>
+          <p:cNvSpPr/>
+          <p:nvPr/>
+        </p:nvSpPr>
+        <p:spPr>
+          <a:xfrm>
+            <a:off x="792302" y="2803888"/>
             <a:ext cx="2635819" cy="548912"/>
           </a:xfrm>
           <a:prstGeom prst="accentCallout1">
             <a:avLst>
               <a:gd name="adj1" fmla="val 41417"/>
               <a:gd name="adj2" fmla="val 103504"/>
-              <a:gd name="adj3" fmla="val 198020"/>
-              <a:gd name="adj4" fmla="val 124595"/>
+              <a:gd name="adj3" fmla="val -75772"/>
+              <a:gd name="adj4" fmla="val 194665"/>
             </a:avLst>
           </a:prstGeom>
           <a:solidFill>
@@ -8184,18 +8791,7 @@
                   <a:schemeClr val="tx1"/>
                 </a:solidFill>
               </a:rPr>
-              <a:t>Both IN and OUT = “BMT1”</a:t>
-            </a:r>
-          </a:p>
-          <a:p>
-            <a:pPr algn="ctr"/>
-            <a:r>
-              <a:rPr lang="en-US" dirty="0" smtClean="0">
-                <a:solidFill>
-                  <a:schemeClr val="tx1"/>
-                </a:solidFill>
-              </a:rPr>
-              <a:t>For ALL 6 PAGES!</a:t>
+              <a:t>Configure your channels with 3 / 4 / 1 / 2</a:t>
             </a:r>
             <a:endParaRPr lang="en-US" dirty="0">
               <a:solidFill>
@@ -8205,56 +8801,10 @@
           </a:p>
         </p:txBody>
       </p:sp>
-      <p:sp>
-        <p:nvSpPr>
-          <p:cNvPr id="6" name="Oval 5"/>
-          <p:cNvSpPr/>
-          <p:nvPr/>
-        </p:nvSpPr>
-        <p:spPr>
-          <a:xfrm>
-            <a:off x="2074024" y="3886200"/>
-            <a:ext cx="1214510" cy="381114"/>
-          </a:xfrm>
-          <a:prstGeom prst="ellipse">
-            <a:avLst/>
-          </a:prstGeom>
-          <a:noFill/>
-          <a:ln w="44450">
-            <a:solidFill>
-              <a:srgbClr val="C00000"/>
-            </a:solidFill>
-          </a:ln>
-        </p:spPr>
-        <p:style>
-          <a:lnRef idx="2">
-            <a:schemeClr val="accent1">
-              <a:shade val="50000"/>
-            </a:schemeClr>
-          </a:lnRef>
-          <a:fillRef idx="1">
-            <a:schemeClr val="accent1"/>
-          </a:fillRef>
-          <a:effectRef idx="0">
-            <a:schemeClr val="accent1"/>
-          </a:effectRef>
-          <a:fontRef idx="minor">
-            <a:schemeClr val="lt1"/>
-          </a:fontRef>
-        </p:style>
-        <p:txBody>
-          <a:bodyPr rtlCol="0" anchor="ctr"/>
-          <a:lstStyle/>
-          <a:p>
-            <a:pPr algn="ctr"/>
-            <a:endParaRPr lang="en-US"/>
-          </a:p>
-        </p:txBody>
-      </p:sp>
     </p:spTree>
     <p:extLst>
       <p:ext uri="{BB962C8B-B14F-4D97-AF65-F5344CB8AC3E}">
-        <p14:creationId xmlns:p14="http://schemas.microsoft.com/office/powerpoint/2010/main" val="2316029519"/>
+        <p14:creationId xmlns:p14="http://schemas.microsoft.com/office/powerpoint/2010/main" val="3468283557"/>
       </p:ext>
     </p:extLst>
   </p:cSld>
@@ -8281,16 +8831,215 @@
           <a:chExt cx="0" cy="0"/>
         </a:xfrm>
       </p:grpSpPr>
+      <p:sp>
+        <p:nvSpPr>
+          <p:cNvPr id="11" name="TextBox 10"/>
+          <p:cNvSpPr txBox="1"/>
+          <p:nvPr/>
+        </p:nvSpPr>
+        <p:spPr>
+          <a:xfrm>
+            <a:off x="152400" y="111145"/>
+            <a:ext cx="5061514" cy="461665"/>
+          </a:xfrm>
+          <a:prstGeom prst="rect">
+            <a:avLst/>
+          </a:prstGeom>
+          <a:noFill/>
+        </p:spPr>
+        <p:txBody>
+          <a:bodyPr wrap="none" rtlCol="0">
+            <a:spAutoFit/>
+          </a:bodyPr>
+          <a:lstStyle/>
+          <a:p>
+            <a:r>
+              <a:rPr lang="en-US" sz="2400" i="1" u="sng" dirty="0" smtClean="0"/>
+              <a:t>TRAKTOR: how to record </a:t>
+            </a:r>
+            <a:r>
+              <a:rPr lang="en-US" sz="2400" i="1" u="sng" dirty="0" err="1" smtClean="0"/>
+              <a:t>Traktor</a:t>
+            </a:r>
+            <a:r>
+              <a:rPr lang="en-US" sz="2400" i="1" u="sng" dirty="0" smtClean="0"/>
+              <a:t> + CDJs</a:t>
+            </a:r>
+            <a:endParaRPr lang="en-US" sz="2400" i="1" u="sng" dirty="0"/>
+          </a:p>
+        </p:txBody>
+      </p:sp>
+      <p:grpSp>
+        <p:nvGrpSpPr>
+          <p:cNvPr id="2" name="Group 1"/>
+          <p:cNvGrpSpPr/>
+          <p:nvPr/>
+        </p:nvGrpSpPr>
+        <p:grpSpPr>
+          <a:xfrm>
+            <a:off x="381000" y="1371600"/>
+            <a:ext cx="4048125" cy="4579276"/>
+            <a:chOff x="371475" y="990600"/>
+            <a:chExt cx="4640610" cy="5249500"/>
+          </a:xfrm>
+        </p:grpSpPr>
+        <p:pic>
+          <p:nvPicPr>
+            <p:cNvPr id="3074" name="Picture 2"/>
+            <p:cNvPicPr>
+              <a:picLocks noChangeAspect="1" noChangeArrowheads="1"/>
+            </p:cNvPicPr>
+            <p:nvPr/>
+          </p:nvPicPr>
+          <p:blipFill>
+            <a:blip r:embed="rId2">
+              <a:extLst>
+                <a:ext uri="{28A0092B-C50C-407E-A947-70E740481C1C}">
+                  <a14:useLocalDpi xmlns:a14="http://schemas.microsoft.com/office/drawing/2010/main" val="0"/>
+                </a:ext>
+              </a:extLst>
+            </a:blip>
+            <a:srcRect/>
+            <a:stretch>
+              <a:fillRect/>
+            </a:stretch>
+          </p:blipFill>
+          <p:spPr bwMode="auto">
+            <a:xfrm>
+              <a:off x="381000" y="990600"/>
+              <a:ext cx="4631085" cy="5249500"/>
+            </a:xfrm>
+            <a:prstGeom prst="rect">
+              <a:avLst/>
+            </a:prstGeom>
+            <a:noFill/>
+            <a:ln>
+              <a:noFill/>
+            </a:ln>
+            <a:extLst>
+              <a:ext uri="{909E8E84-426E-40DD-AFC4-6F175D3DCCD1}">
+                <a14:hiddenFill xmlns:a14="http://schemas.microsoft.com/office/drawing/2010/main">
+                  <a:solidFill>
+                    <a:schemeClr val="accent1"/>
+                  </a:solidFill>
+                </a14:hiddenFill>
+              </a:ext>
+              <a:ext uri="{91240B29-F687-4F45-9708-019B960494DF}">
+                <a14:hiddenLine xmlns:a14="http://schemas.microsoft.com/office/drawing/2010/main" w="9525">
+                  <a:solidFill>
+                    <a:schemeClr val="tx1"/>
+                  </a:solidFill>
+                  <a:miter lim="800000"/>
+                  <a:headEnd/>
+                  <a:tailEnd/>
+                </a14:hiddenLine>
+              </a:ext>
+            </a:extLst>
+          </p:spPr>
+        </p:pic>
+        <p:sp>
+          <p:nvSpPr>
+            <p:cNvPr id="9" name="Oval 8"/>
+            <p:cNvSpPr/>
+            <p:nvPr/>
+          </p:nvSpPr>
+          <p:spPr>
+            <a:xfrm>
+              <a:off x="371475" y="1447800"/>
+              <a:ext cx="1214510" cy="381114"/>
+            </a:xfrm>
+            <a:prstGeom prst="ellipse">
+              <a:avLst/>
+            </a:prstGeom>
+            <a:noFill/>
+            <a:ln w="44450">
+              <a:solidFill>
+                <a:srgbClr val="C00000"/>
+              </a:solidFill>
+            </a:ln>
+          </p:spPr>
+          <p:style>
+            <a:lnRef idx="2">
+              <a:schemeClr val="accent1">
+                <a:shade val="50000"/>
+              </a:schemeClr>
+            </a:lnRef>
+            <a:fillRef idx="1">
+              <a:schemeClr val="accent1"/>
+            </a:fillRef>
+            <a:effectRef idx="0">
+              <a:schemeClr val="accent1"/>
+            </a:effectRef>
+            <a:fontRef idx="minor">
+              <a:schemeClr val="lt1"/>
+            </a:fontRef>
+          </p:style>
+          <p:txBody>
+            <a:bodyPr rtlCol="0" anchor="ctr"/>
+            <a:lstStyle/>
+            <a:p>
+              <a:pPr algn="ctr"/>
+              <a:endParaRPr lang="en-US"/>
+            </a:p>
+          </p:txBody>
+        </p:sp>
+        <p:sp>
+          <p:nvSpPr>
+            <p:cNvPr id="10" name="Oval 9"/>
+            <p:cNvSpPr/>
+            <p:nvPr/>
+          </p:nvSpPr>
+          <p:spPr>
+            <a:xfrm>
+              <a:off x="2236421" y="3397426"/>
+              <a:ext cx="2775663" cy="435847"/>
+            </a:xfrm>
+            <a:prstGeom prst="ellipse">
+              <a:avLst/>
+            </a:prstGeom>
+            <a:noFill/>
+            <a:ln w="44450">
+              <a:solidFill>
+                <a:srgbClr val="C00000"/>
+              </a:solidFill>
+            </a:ln>
+          </p:spPr>
+          <p:style>
+            <a:lnRef idx="2">
+              <a:schemeClr val="accent1">
+                <a:shade val="50000"/>
+              </a:schemeClr>
+            </a:lnRef>
+            <a:fillRef idx="1">
+              <a:schemeClr val="accent1"/>
+            </a:fillRef>
+            <a:effectRef idx="0">
+              <a:schemeClr val="accent1"/>
+            </a:effectRef>
+            <a:fontRef idx="minor">
+              <a:schemeClr val="lt1"/>
+            </a:fontRef>
+          </p:style>
+          <p:txBody>
+            <a:bodyPr rtlCol="0" anchor="ctr"/>
+            <a:lstStyle/>
+            <a:p>
+              <a:pPr algn="ctr"/>
+              <a:endParaRPr lang="en-US"/>
+            </a:p>
+          </p:txBody>
+        </p:sp>
+      </p:grpSp>
       <p:pic>
         <p:nvPicPr>
-          <p:cNvPr id="6" name="Picture 6" descr="C:\Users\Pedro\Desktop\Z_DRIVE_Pedro\2 Music - Controllers\0_MAPS_Traktor\DDJ Pioneer\v6.5.0 - DDJ-1000 - TP3_TP2 BOME\Support files\Source files\Installation\5 - TRAKTOR - all mapping pages.JPG"/>
+          <p:cNvPr id="3" name="Picture 3"/>
           <p:cNvPicPr>
             <a:picLocks noChangeAspect="1" noChangeArrowheads="1"/>
           </p:cNvPicPr>
           <p:nvPr/>
         </p:nvPicPr>
         <p:blipFill>
-          <a:blip r:embed="rId2">
+          <a:blip r:embed="rId3">
             <a:extLst>
               <a:ext uri="{28A0092B-C50C-407E-A947-70E740481C1C}">
                 <a14:useLocalDpi xmlns:a14="http://schemas.microsoft.com/office/drawing/2010/main" val="0"/>
@@ -8304,63 +9053,47 @@
         </p:blipFill>
         <p:spPr bwMode="auto">
           <a:xfrm>
-            <a:off x="2093074" y="1329962"/>
-            <a:ext cx="4195852" cy="4715637"/>
+            <a:off x="4800600" y="1371600"/>
+            <a:ext cx="4024622" cy="4542945"/>
           </a:xfrm>
           <a:prstGeom prst="rect">
             <a:avLst/>
           </a:prstGeom>
           <a:noFill/>
+          <a:ln>
+            <a:noFill/>
+          </a:ln>
           <a:extLst>
             <a:ext uri="{909E8E84-426E-40DD-AFC4-6F175D3DCCD1}">
               <a14:hiddenFill xmlns:a14="http://schemas.microsoft.com/office/drawing/2010/main">
                 <a:solidFill>
-                  <a:srgbClr val="FFFFFF"/>
+                  <a:schemeClr val="accent1"/>
                 </a:solidFill>
               </a14:hiddenFill>
             </a:ext>
+            <a:ext uri="{91240B29-F687-4F45-9708-019B960494DF}">
+              <a14:hiddenLine xmlns:a14="http://schemas.microsoft.com/office/drawing/2010/main" w="9525">
+                <a:solidFill>
+                  <a:schemeClr val="tx1"/>
+                </a:solidFill>
+                <a:miter lim="800000"/>
+                <a:headEnd/>
+                <a:tailEnd/>
+              </a14:hiddenLine>
+            </a:ext>
           </a:extLst>
         </p:spPr>
       </p:pic>
       <p:sp>
         <p:nvSpPr>
-          <p:cNvPr id="11" name="TextBox 10"/>
-          <p:cNvSpPr txBox="1"/>
-          <p:nvPr/>
-        </p:nvSpPr>
-        <p:spPr>
-          <a:xfrm>
-            <a:off x="152400" y="111145"/>
-            <a:ext cx="3674596" cy="461665"/>
-          </a:xfrm>
-          <a:prstGeom prst="rect">
-            <a:avLst/>
-          </a:prstGeom>
-          <a:noFill/>
-        </p:spPr>
-        <p:txBody>
-          <a:bodyPr wrap="none" rtlCol="0">
-            <a:spAutoFit/>
-          </a:bodyPr>
-          <a:lstStyle/>
-          <a:p>
-            <a:r>
-              <a:rPr lang="en-US" sz="2400" i="1" u="sng" dirty="0"/>
-              <a:t>TRAKTOR:  MIDI via “BMT1”</a:t>
-            </a:r>
-          </a:p>
-        </p:txBody>
-      </p:sp>
-      <p:sp>
-        <p:nvSpPr>
-          <p:cNvPr id="15" name="Oval 14"/>
+          <p:cNvPr id="13" name="Oval 12"/>
           <p:cNvSpPr/>
           <p:nvPr/>
         </p:nvSpPr>
         <p:spPr>
           <a:xfrm>
-            <a:off x="4912474" y="1863362"/>
-            <a:ext cx="1066800" cy="838200"/>
+            <a:off x="5943600" y="1721770"/>
+            <a:ext cx="2057400" cy="381114"/>
           </a:xfrm>
           <a:prstGeom prst="ellipse">
             <a:avLst/>
@@ -8399,13 +9132,13 @@
       </p:sp>
       <p:sp>
         <p:nvSpPr>
-          <p:cNvPr id="9" name="Oval 8"/>
+          <p:cNvPr id="14" name="Oval 13"/>
           <p:cNvSpPr/>
           <p:nvPr/>
         </p:nvSpPr>
         <p:spPr>
           <a:xfrm>
-            <a:off x="2074024" y="3886200"/>
+            <a:off x="4767190" y="2971800"/>
             <a:ext cx="1214510" cy="381114"/>
           </a:xfrm>
           <a:prstGeom prst="ellipse">
@@ -8443,77 +9176,10 @@
           </a:p>
         </p:txBody>
       </p:sp>
-      <p:sp>
-        <p:nvSpPr>
-          <p:cNvPr id="13" name="Line Callout 1 (Accent Bar) 12"/>
-          <p:cNvSpPr/>
-          <p:nvPr/>
-        </p:nvSpPr>
-        <p:spPr>
-          <a:xfrm>
-            <a:off x="2133600" y="685800"/>
-            <a:ext cx="2635819" cy="548912"/>
-          </a:xfrm>
-          <a:prstGeom prst="accentCallout1">
-            <a:avLst>
-              <a:gd name="adj1" fmla="val 41417"/>
-              <a:gd name="adj2" fmla="val 103504"/>
-              <a:gd name="adj3" fmla="val 220531"/>
-              <a:gd name="adj4" fmla="val 117719"/>
-            </a:avLst>
-          </a:prstGeom>
-          <a:solidFill>
-            <a:schemeClr val="bg1">
-              <a:lumMod val="85000"/>
-            </a:schemeClr>
-          </a:solidFill>
-          <a:ln>
-            <a:solidFill>
-              <a:schemeClr val="accent2"/>
-            </a:solidFill>
-          </a:ln>
-        </p:spPr>
-        <p:style>
-          <a:lnRef idx="2">
-            <a:schemeClr val="accent1">
-              <a:shade val="50000"/>
-            </a:schemeClr>
-          </a:lnRef>
-          <a:fillRef idx="1">
-            <a:schemeClr val="accent1"/>
-          </a:fillRef>
-          <a:effectRef idx="0">
-            <a:schemeClr val="accent1"/>
-          </a:effectRef>
-          <a:fontRef idx="minor">
-            <a:schemeClr val="lt1"/>
-          </a:fontRef>
-        </p:style>
-        <p:txBody>
-          <a:bodyPr lIns="0" tIns="0" rIns="0" bIns="0" rtlCol="0" anchor="ctr"/>
-          <a:lstStyle/>
-          <a:p>
-            <a:pPr algn="ctr"/>
-            <a:r>
-              <a:rPr lang="en-US" dirty="0" smtClean="0">
-                <a:solidFill>
-                  <a:schemeClr val="tx1"/>
-                </a:solidFill>
-              </a:rPr>
-              <a:t>ALL 6 PAGES WITH BMT1!</a:t>
-            </a:r>
-            <a:endParaRPr lang="en-US" dirty="0">
-              <a:solidFill>
-                <a:schemeClr val="tx1"/>
-              </a:solidFill>
-            </a:endParaRPr>
-          </a:p>
-        </p:txBody>
-      </p:sp>
     </p:spTree>
     <p:extLst>
       <p:ext uri="{BB962C8B-B14F-4D97-AF65-F5344CB8AC3E}">
-        <p14:creationId xmlns:p14="http://schemas.microsoft.com/office/powerpoint/2010/main" val="723214848"/>
+        <p14:creationId xmlns:p14="http://schemas.microsoft.com/office/powerpoint/2010/main" val="1716697291"/>
       </p:ext>
     </p:extLst>
   </p:cSld>
@@ -8542,13 +9208,13 @@
       </p:grpSpPr>
       <p:pic>
         <p:nvPicPr>
-          <p:cNvPr id="12" name="Picture 8" descr="C:\Users\Pedro\Desktop\Z_DRIVE_Pedro\2 Music - Controllers\0_MAPS_Traktor\DDJ Pioneer\v6.5.0 - DDJ-1000 - TP3_TP2 BOME\Support files\Source files\Installation\7 - BOME - debug bidirectional flow.JPG"/>
+          <p:cNvPr id="4099" name="Picture 3"/>
           <p:cNvPicPr>
             <a:picLocks noChangeAspect="1" noChangeArrowheads="1"/>
           </p:cNvPicPr>
           <p:nvPr/>
         </p:nvPicPr>
-        <p:blipFill>
+        <p:blipFill rotWithShape="1">
           <a:blip r:embed="rId2">
             <a:extLst>
               <a:ext uri="{28A0092B-C50C-407E-A947-70E740481C1C}">
@@ -8556,31 +9222,186 @@
               </a:ext>
             </a:extLst>
           </a:blip>
-          <a:srcRect/>
-          <a:stretch>
-            <a:fillRect/>
-          </a:stretch>
+          <a:srcRect b="10775"/>
+          <a:stretch/>
         </p:blipFill>
         <p:spPr bwMode="auto">
           <a:xfrm>
-            <a:off x="1295400" y="1082039"/>
-            <a:ext cx="6705600" cy="4810125"/>
+            <a:off x="4876800" y="1405978"/>
+            <a:ext cx="4121590" cy="4478775"/>
           </a:xfrm>
           <a:prstGeom prst="rect">
             <a:avLst/>
           </a:prstGeom>
           <a:noFill/>
+          <a:ln>
+            <a:noFill/>
+          </a:ln>
           <a:extLst>
             <a:ext uri="{909E8E84-426E-40DD-AFC4-6F175D3DCCD1}">
               <a14:hiddenFill xmlns:a14="http://schemas.microsoft.com/office/drawing/2010/main">
                 <a:solidFill>
-                  <a:srgbClr val="FFFFFF"/>
+                  <a:schemeClr val="accent1"/>
                 </a:solidFill>
               </a14:hiddenFill>
             </a:ext>
+            <a:ext uri="{91240B29-F687-4F45-9708-019B960494DF}">
+              <a14:hiddenLine xmlns:a14="http://schemas.microsoft.com/office/drawing/2010/main" w="9525">
+                <a:solidFill>
+                  <a:schemeClr val="tx1"/>
+                </a:solidFill>
+                <a:miter lim="800000"/>
+                <a:headEnd/>
+                <a:tailEnd/>
+              </a14:hiddenLine>
+            </a:ext>
           </a:extLst>
         </p:spPr>
       </p:pic>
+      <p:pic>
+        <p:nvPicPr>
+          <p:cNvPr id="4098" name="Picture 2"/>
+          <p:cNvPicPr>
+            <a:picLocks noChangeAspect="1" noChangeArrowheads="1"/>
+          </p:cNvPicPr>
+          <p:nvPr/>
+        </p:nvPicPr>
+        <p:blipFill rotWithShape="1">
+          <a:blip r:embed="rId3">
+            <a:extLst>
+              <a:ext uri="{28A0092B-C50C-407E-A947-70E740481C1C}">
+                <a14:useLocalDpi xmlns:a14="http://schemas.microsoft.com/office/drawing/2010/main" val="0"/>
+              </a:ext>
+            </a:extLst>
+          </a:blip>
+          <a:srcRect b="10775"/>
+          <a:stretch/>
+        </p:blipFill>
+        <p:spPr bwMode="auto">
+          <a:xfrm>
+            <a:off x="152400" y="1405979"/>
+            <a:ext cx="4535270" cy="4478774"/>
+          </a:xfrm>
+          <a:prstGeom prst="rect">
+            <a:avLst/>
+          </a:prstGeom>
+          <a:noFill/>
+          <a:ln>
+            <a:noFill/>
+          </a:ln>
+          <a:extLst>
+            <a:ext uri="{909E8E84-426E-40DD-AFC4-6F175D3DCCD1}">
+              <a14:hiddenFill xmlns:a14="http://schemas.microsoft.com/office/drawing/2010/main">
+                <a:solidFill>
+                  <a:schemeClr val="accent1"/>
+                </a:solidFill>
+              </a14:hiddenFill>
+            </a:ext>
+            <a:ext uri="{91240B29-F687-4F45-9708-019B960494DF}">
+              <a14:hiddenLine xmlns:a14="http://schemas.microsoft.com/office/drawing/2010/main" w="9525">
+                <a:solidFill>
+                  <a:schemeClr val="tx1"/>
+                </a:solidFill>
+                <a:miter lim="800000"/>
+                <a:headEnd/>
+                <a:tailEnd/>
+              </a14:hiddenLine>
+            </a:ext>
+          </a:extLst>
+        </p:spPr>
+      </p:pic>
+      <p:sp>
+        <p:nvSpPr>
+          <p:cNvPr id="8" name="Oval 7"/>
+          <p:cNvSpPr/>
+          <p:nvPr/>
+        </p:nvSpPr>
+        <p:spPr>
+          <a:xfrm>
+            <a:off x="2286000" y="1869352"/>
+            <a:ext cx="1066800" cy="342900"/>
+          </a:xfrm>
+          <a:prstGeom prst="ellipse">
+            <a:avLst/>
+          </a:prstGeom>
+          <a:noFill/>
+          <a:ln w="44450">
+            <a:solidFill>
+              <a:srgbClr val="C00000"/>
+            </a:solidFill>
+          </a:ln>
+        </p:spPr>
+        <p:style>
+          <a:lnRef idx="2">
+            <a:schemeClr val="accent1">
+              <a:shade val="50000"/>
+            </a:schemeClr>
+          </a:lnRef>
+          <a:fillRef idx="1">
+            <a:schemeClr val="accent1"/>
+          </a:fillRef>
+          <a:effectRef idx="0">
+            <a:schemeClr val="accent1"/>
+          </a:effectRef>
+          <a:fontRef idx="minor">
+            <a:schemeClr val="lt1"/>
+          </a:fontRef>
+        </p:style>
+        <p:txBody>
+          <a:bodyPr rtlCol="0" anchor="ctr"/>
+          <a:lstStyle/>
+          <a:p>
+            <a:pPr algn="ctr"/>
+            <a:endParaRPr lang="en-US"/>
+          </a:p>
+        </p:txBody>
+      </p:sp>
+      <p:sp>
+        <p:nvSpPr>
+          <p:cNvPr id="6" name="Oval 5"/>
+          <p:cNvSpPr/>
+          <p:nvPr/>
+        </p:nvSpPr>
+        <p:spPr>
+          <a:xfrm>
+            <a:off x="160838" y="4166103"/>
+            <a:ext cx="1214510" cy="381114"/>
+          </a:xfrm>
+          <a:prstGeom prst="ellipse">
+            <a:avLst/>
+          </a:prstGeom>
+          <a:noFill/>
+          <a:ln w="44450">
+            <a:solidFill>
+              <a:srgbClr val="C00000"/>
+            </a:solidFill>
+          </a:ln>
+        </p:spPr>
+        <p:style>
+          <a:lnRef idx="2">
+            <a:schemeClr val="accent1">
+              <a:shade val="50000"/>
+            </a:schemeClr>
+          </a:lnRef>
+          <a:fillRef idx="1">
+            <a:schemeClr val="accent1"/>
+          </a:fillRef>
+          <a:effectRef idx="0">
+            <a:schemeClr val="accent1"/>
+          </a:effectRef>
+          <a:fontRef idx="minor">
+            <a:schemeClr val="lt1"/>
+          </a:fontRef>
+        </p:style>
+        <p:txBody>
+          <a:bodyPr rtlCol="0" anchor="ctr"/>
+          <a:lstStyle/>
+          <a:p>
+            <a:pPr algn="ctr"/>
+            <a:endParaRPr lang="en-US"/>
+          </a:p>
+        </p:txBody>
+      </p:sp>
       <p:sp>
         <p:nvSpPr>
           <p:cNvPr id="11" name="TextBox 10"/>
@@ -8590,7 +9411,7 @@
         <p:spPr>
           <a:xfrm>
             <a:off x="152400" y="111145"/>
-            <a:ext cx="4314771" cy="461665"/>
+            <a:ext cx="5608202" cy="461665"/>
           </a:xfrm>
           <a:prstGeom prst="rect">
             <a:avLst/>
@@ -8605,12 +9426,9 @@
           <a:p>
             <a:r>
               <a:rPr lang="en-US" sz="2400" i="1" u="sng" dirty="0" smtClean="0"/>
-              <a:t>BOME: confirm bidirectional </a:t>
-            </a:r>
-            <a:r>
-              <a:rPr lang="en-US" sz="2400" i="1" u="sng" dirty="0"/>
-              <a:t>flow</a:t>
-            </a:r>
+              <a:t>TRAKTOR: check MIDI device is long format</a:t>
+            </a:r>
+            <a:endParaRPr lang="en-US" sz="2400" i="1" u="sng" dirty="0"/>
           </a:p>
         </p:txBody>
       </p:sp>
@@ -8622,15 +9440,15 @@
         </p:nvSpPr>
         <p:spPr>
           <a:xfrm>
-            <a:off x="5867400" y="1752600"/>
-            <a:ext cx="1828800" cy="1143000"/>
+            <a:off x="4723129" y="606830"/>
+            <a:ext cx="3081886" cy="548912"/>
           </a:xfrm>
           <a:prstGeom prst="accentCallout1">
             <a:avLst>
-              <a:gd name="adj1" fmla="val 45417"/>
-              <a:gd name="adj2" fmla="val -2669"/>
-              <a:gd name="adj3" fmla="val 30509"/>
-              <a:gd name="adj4" fmla="val -60190"/>
+              <a:gd name="adj1" fmla="val 41417"/>
+              <a:gd name="adj2" fmla="val 103504"/>
+              <a:gd name="adj3" fmla="val 231007"/>
+              <a:gd name="adj4" fmla="val 113432"/>
             </a:avLst>
           </a:prstGeom>
           <a:solidFill>
@@ -8664,30 +9482,39 @@
           <a:bodyPr lIns="0" tIns="0" rIns="0" bIns="0" rtlCol="0" anchor="ctr"/>
           <a:lstStyle/>
           <a:p>
-            <a:r>
-              <a:rPr lang="en-US" sz="1200" dirty="0" smtClean="0">
+            <a:pPr algn="r"/>
+            <a:r>
+              <a:rPr lang="en-US" dirty="0" smtClean="0">
                 <a:solidFill>
                   <a:schemeClr val="tx1"/>
                 </a:solidFill>
               </a:rPr>
-              <a:t>Pressing and releasing any button generates at least 8x log lines. </a:t>
+              <a:t>Both IN and OUT = Long format</a:t>
+            </a:r>
+            <a:r>
+              <a:rPr lang="en-US" dirty="0">
+                <a:solidFill>
+                  <a:schemeClr val="tx1"/>
+                </a:solidFill>
+              </a:rPr>
+              <a:t/>
             </a:r>
             <a:br>
-              <a:rPr lang="en-US" sz="1200" dirty="0" smtClean="0">
+              <a:rPr lang="en-US" dirty="0">
                 <a:solidFill>
                   <a:schemeClr val="tx1"/>
                 </a:solidFill>
               </a:rPr>
             </a:br>
             <a:r>
-              <a:rPr lang="en-US" sz="1200" dirty="0" smtClean="0">
+              <a:rPr lang="en-US" dirty="0" smtClean="0">
                 <a:solidFill>
                   <a:schemeClr val="tx1"/>
                 </a:solidFill>
               </a:rPr>
-              <a:t>This is both in the DDJ-&gt;BMT1 direction and the BMT1-&gt;DDJ direction</a:t>
-            </a:r>
-            <a:endParaRPr lang="en-US" sz="1200" dirty="0">
+              <a:t>For ALL 6 PAGES!</a:t>
+            </a:r>
+            <a:endParaRPr lang="en-US" dirty="0">
               <a:solidFill>
                 <a:schemeClr val="tx1"/>
               </a:solidFill>
@@ -8697,113 +9524,21 @@
       </p:sp>
       <p:sp>
         <p:nvSpPr>
-          <p:cNvPr id="15" name="Oval 14"/>
+          <p:cNvPr id="9" name="Line Callout 1 (Accent Bar) 8"/>
           <p:cNvSpPr/>
           <p:nvPr/>
         </p:nvSpPr>
         <p:spPr>
           <a:xfrm>
-            <a:off x="3099707" y="5302704"/>
-            <a:ext cx="1524000" cy="466725"/>
-          </a:xfrm>
-          <a:prstGeom prst="ellipse">
-            <a:avLst/>
-          </a:prstGeom>
-          <a:noFill/>
-          <a:ln w="44450">
-            <a:solidFill>
-              <a:srgbClr val="C00000"/>
-            </a:solidFill>
-          </a:ln>
-        </p:spPr>
-        <p:style>
-          <a:lnRef idx="2">
-            <a:schemeClr val="accent1">
-              <a:shade val="50000"/>
-            </a:schemeClr>
-          </a:lnRef>
-          <a:fillRef idx="1">
-            <a:schemeClr val="accent1"/>
-          </a:fillRef>
-          <a:effectRef idx="0">
-            <a:schemeClr val="accent1"/>
-          </a:effectRef>
-          <a:fontRef idx="minor">
-            <a:schemeClr val="lt1"/>
-          </a:fontRef>
-        </p:style>
-        <p:txBody>
-          <a:bodyPr rtlCol="0" anchor="ctr"/>
-          <a:lstStyle/>
-          <a:p>
-            <a:pPr algn="ctr"/>
-            <a:endParaRPr lang="en-US"/>
-          </a:p>
-        </p:txBody>
-      </p:sp>
-      <p:sp>
-        <p:nvSpPr>
-          <p:cNvPr id="6" name="Oval 5"/>
-          <p:cNvSpPr/>
-          <p:nvPr/>
-        </p:nvSpPr>
-        <p:spPr>
-          <a:xfrm>
-            <a:off x="2723562" y="1117418"/>
-            <a:ext cx="1524000" cy="466725"/>
-          </a:xfrm>
-          <a:prstGeom prst="ellipse">
-            <a:avLst/>
-          </a:prstGeom>
-          <a:noFill/>
-          <a:ln w="44450">
-            <a:solidFill>
-              <a:srgbClr val="C00000"/>
-            </a:solidFill>
-          </a:ln>
-        </p:spPr>
-        <p:style>
-          <a:lnRef idx="2">
-            <a:schemeClr val="accent1">
-              <a:shade val="50000"/>
-            </a:schemeClr>
-          </a:lnRef>
-          <a:fillRef idx="1">
-            <a:schemeClr val="accent1"/>
-          </a:fillRef>
-          <a:effectRef idx="0">
-            <a:schemeClr val="accent1"/>
-          </a:effectRef>
-          <a:fontRef idx="minor">
-            <a:schemeClr val="lt1"/>
-          </a:fontRef>
-        </p:style>
-        <p:txBody>
-          <a:bodyPr rtlCol="0" anchor="ctr"/>
-          <a:lstStyle/>
-          <a:p>
-            <a:pPr algn="ctr"/>
-            <a:endParaRPr lang="en-US"/>
-          </a:p>
-        </p:txBody>
-      </p:sp>
-      <p:sp>
-        <p:nvSpPr>
-          <p:cNvPr id="7" name="Line Callout 1 (Accent Bar) 6"/>
-          <p:cNvSpPr/>
-          <p:nvPr/>
-        </p:nvSpPr>
-        <p:spPr>
-          <a:xfrm>
-            <a:off x="3048000" y="6096000"/>
-            <a:ext cx="1199562" cy="253364"/>
+            <a:off x="595987" y="708102"/>
+            <a:ext cx="1558721" cy="346369"/>
           </a:xfrm>
           <a:prstGeom prst="accentCallout1">
             <a:avLst>
-              <a:gd name="adj1" fmla="val 45417"/>
-              <a:gd name="adj2" fmla="val -2669"/>
-              <a:gd name="adj3" fmla="val -171077"/>
-              <a:gd name="adj4" fmla="val -61873"/>
+              <a:gd name="adj1" fmla="val 41417"/>
+              <a:gd name="adj2" fmla="val 103504"/>
+              <a:gd name="adj3" fmla="val 333938"/>
+              <a:gd name="adj4" fmla="val 150732"/>
             </a:avLst>
           </a:prstGeom>
           <a:solidFill>
@@ -8837,15 +9572,16 @@
           <a:bodyPr lIns="0" tIns="0" rIns="0" bIns="0" rtlCol="0" anchor="ctr"/>
           <a:lstStyle/>
           <a:p>
-            <a:r>
-              <a:rPr lang="en-US" sz="1200" dirty="0" smtClean="0">
+            <a:pPr algn="r"/>
+            <a:r>
+              <a:rPr lang="en-US" dirty="0" smtClean="0">
                 <a:solidFill>
                   <a:schemeClr val="tx1"/>
                 </a:solidFill>
               </a:rPr>
-              <a:t>Stop “rules” log</a:t>
-            </a:r>
-            <a:endParaRPr lang="en-US" sz="1200" dirty="0">
+              <a:t>first click here</a:t>
+            </a:r>
+            <a:endParaRPr lang="en-US" dirty="0">
               <a:solidFill>
                 <a:schemeClr val="tx1"/>
               </a:solidFill>
@@ -8853,10 +9589,56 @@
           </a:p>
         </p:txBody>
       </p:sp>
+      <p:sp>
+        <p:nvSpPr>
+          <p:cNvPr id="12" name="Oval 11"/>
+          <p:cNvSpPr/>
+          <p:nvPr/>
+        </p:nvSpPr>
+        <p:spPr>
+          <a:xfrm>
+            <a:off x="6507932" y="1855017"/>
+            <a:ext cx="2712267" cy="986828"/>
+          </a:xfrm>
+          <a:prstGeom prst="ellipse">
+            <a:avLst/>
+          </a:prstGeom>
+          <a:noFill/>
+          <a:ln w="44450">
+            <a:solidFill>
+              <a:srgbClr val="C00000"/>
+            </a:solidFill>
+          </a:ln>
+        </p:spPr>
+        <p:style>
+          <a:lnRef idx="2">
+            <a:schemeClr val="accent1">
+              <a:shade val="50000"/>
+            </a:schemeClr>
+          </a:lnRef>
+          <a:fillRef idx="1">
+            <a:schemeClr val="accent1"/>
+          </a:fillRef>
+          <a:effectRef idx="0">
+            <a:schemeClr val="accent1"/>
+          </a:effectRef>
+          <a:fontRef idx="minor">
+            <a:schemeClr val="lt1"/>
+          </a:fontRef>
+        </p:style>
+        <p:txBody>
+          <a:bodyPr rtlCol="0" anchor="ctr"/>
+          <a:lstStyle/>
+          <a:p>
+            <a:pPr algn="ctr"/>
+            <a:endParaRPr lang="en-US"/>
+          </a:p>
+        </p:txBody>
+      </p:sp>
     </p:spTree>
     <p:extLst>
       <p:ext uri="{BB962C8B-B14F-4D97-AF65-F5344CB8AC3E}">
-        <p14:creationId xmlns:p14="http://schemas.microsoft.com/office/powerpoint/2010/main" val="37768991"/>
+        <p14:creationId xmlns:p14="http://schemas.microsoft.com/office/powerpoint/2010/main" val="2316029519"/>
       </p:ext>
     </p:extLst>
   </p:cSld>
@@ -8883,16 +9665,57 @@
           <a:chExt cx="0" cy="0"/>
         </a:xfrm>
       </p:grpSpPr>
-      <p:sp>
-        <p:nvSpPr>
-          <p:cNvPr id="3" name="TextBox 2"/>
+      <p:pic>
+        <p:nvPicPr>
+          <p:cNvPr id="12" name="Picture 8" descr="C:\Users\Pedro\Desktop\Z_DRIVE_Pedro\2 Music - Controllers\0_MAPS_Traktor\DDJ Pioneer\v6.5.0 - DDJ-1000 - TP3_TP2 BOME\Support files\Source files\Installation\7 - BOME - debug bidirectional flow.JPG"/>
+          <p:cNvPicPr>
+            <a:picLocks noChangeAspect="1" noChangeArrowheads="1"/>
+          </p:cNvPicPr>
+          <p:nvPr/>
+        </p:nvPicPr>
+        <p:blipFill>
+          <a:blip r:embed="rId2">
+            <a:extLst>
+              <a:ext uri="{28A0092B-C50C-407E-A947-70E740481C1C}">
+                <a14:useLocalDpi xmlns:a14="http://schemas.microsoft.com/office/drawing/2010/main" val="0"/>
+              </a:ext>
+            </a:extLst>
+          </a:blip>
+          <a:srcRect/>
+          <a:stretch>
+            <a:fillRect/>
+          </a:stretch>
+        </p:blipFill>
+        <p:spPr bwMode="auto">
+          <a:xfrm>
+            <a:off x="1295400" y="1082039"/>
+            <a:ext cx="6705600" cy="4810125"/>
+          </a:xfrm>
+          <a:prstGeom prst="rect">
+            <a:avLst/>
+          </a:prstGeom>
+          <a:noFill/>
+          <a:extLst>
+            <a:ext uri="{909E8E84-426E-40DD-AFC4-6F175D3DCCD1}">
+              <a14:hiddenFill xmlns:a14="http://schemas.microsoft.com/office/drawing/2010/main">
+                <a:solidFill>
+                  <a:srgbClr val="FFFFFF"/>
+                </a:solidFill>
+              </a14:hiddenFill>
+            </a:ext>
+          </a:extLst>
+        </p:spPr>
+      </p:pic>
+      <p:sp>
+        <p:nvSpPr>
+          <p:cNvPr id="11" name="TextBox 10"/>
           <p:cNvSpPr txBox="1"/>
           <p:nvPr/>
         </p:nvSpPr>
         <p:spPr>
           <a:xfrm>
-            <a:off x="381000" y="914400"/>
-            <a:ext cx="8305800" cy="4031873"/>
+            <a:off x="152400" y="111145"/>
+            <a:ext cx="4314771" cy="461665"/>
           </a:xfrm>
           <a:prstGeom prst="rect">
             <a:avLst/>
@@ -8900,80 +9723,271 @@
           <a:noFill/>
         </p:spPr>
         <p:txBody>
-          <a:bodyPr wrap="square" rtlCol="0">
+          <a:bodyPr wrap="none" rtlCol="0">
             <a:spAutoFit/>
           </a:bodyPr>
           <a:lstStyle/>
           <a:p>
+            <a:r>
+              <a:rPr lang="en-US" sz="2400" i="1" u="sng" dirty="0" smtClean="0"/>
+              <a:t>BOME: confirm bidirectional </a:t>
+            </a:r>
+            <a:r>
+              <a:rPr lang="en-US" sz="2400" i="1" u="sng" dirty="0"/>
+              <a:t>flow</a:t>
+            </a:r>
+          </a:p>
+        </p:txBody>
+      </p:sp>
+      <p:sp>
+        <p:nvSpPr>
+          <p:cNvPr id="14" name="Line Callout 1 (Accent Bar) 13"/>
+          <p:cNvSpPr/>
+          <p:nvPr/>
+        </p:nvSpPr>
+        <p:spPr>
+          <a:xfrm>
+            <a:off x="5867400" y="1752600"/>
+            <a:ext cx="1828800" cy="1143000"/>
+          </a:xfrm>
+          <a:prstGeom prst="accentCallout1">
+            <a:avLst>
+              <a:gd name="adj1" fmla="val 45417"/>
+              <a:gd name="adj2" fmla="val -2669"/>
+              <a:gd name="adj3" fmla="val 30509"/>
+              <a:gd name="adj4" fmla="val -60190"/>
+            </a:avLst>
+          </a:prstGeom>
+          <a:solidFill>
+            <a:schemeClr val="bg1">
+              <a:lumMod val="85000"/>
+            </a:schemeClr>
+          </a:solidFill>
+          <a:ln>
+            <a:solidFill>
+              <a:schemeClr val="accent2"/>
+            </a:solidFill>
+          </a:ln>
+        </p:spPr>
+        <p:style>
+          <a:lnRef idx="2">
+            <a:schemeClr val="accent1">
+              <a:shade val="50000"/>
+            </a:schemeClr>
+          </a:lnRef>
+          <a:fillRef idx="1">
+            <a:schemeClr val="accent1"/>
+          </a:fillRef>
+          <a:effectRef idx="0">
+            <a:schemeClr val="accent1"/>
+          </a:effectRef>
+          <a:fontRef idx="minor">
+            <a:schemeClr val="lt1"/>
+          </a:fontRef>
+        </p:style>
+        <p:txBody>
+          <a:bodyPr lIns="0" tIns="0" rIns="0" bIns="0" rtlCol="0" anchor="ctr"/>
+          <a:lstStyle/>
+          <a:p>
+            <a:r>
+              <a:rPr lang="en-US" sz="1200" dirty="0" smtClean="0">
+                <a:solidFill>
+                  <a:schemeClr val="tx1"/>
+                </a:solidFill>
+              </a:rPr>
+              <a:t>Pressing and releasing any button generates at least 8x log lines. </a:t>
+            </a:r>
+            <a:br>
+              <a:rPr lang="en-US" sz="1200" dirty="0" smtClean="0">
+                <a:solidFill>
+                  <a:schemeClr val="tx1"/>
+                </a:solidFill>
+              </a:rPr>
+            </a:br>
+            <a:r>
+              <a:rPr lang="en-US" sz="1200" dirty="0" smtClean="0">
+                <a:solidFill>
+                  <a:schemeClr val="tx1"/>
+                </a:solidFill>
+              </a:rPr>
+              <a:t>This is both in the DDJ-&gt;BMT1 direction and the BMT1-&gt;DDJ direction</a:t>
+            </a:r>
+            <a:endParaRPr lang="en-US" sz="1200" dirty="0">
+              <a:solidFill>
+                <a:schemeClr val="tx1"/>
+              </a:solidFill>
+            </a:endParaRPr>
+          </a:p>
+        </p:txBody>
+      </p:sp>
+      <p:sp>
+        <p:nvSpPr>
+          <p:cNvPr id="15" name="Oval 14"/>
+          <p:cNvSpPr/>
+          <p:nvPr/>
+        </p:nvSpPr>
+        <p:spPr>
+          <a:xfrm>
+            <a:off x="3099707" y="5302704"/>
+            <a:ext cx="1524000" cy="466725"/>
+          </a:xfrm>
+          <a:prstGeom prst="ellipse">
+            <a:avLst/>
+          </a:prstGeom>
+          <a:noFill/>
+          <a:ln w="44450">
+            <a:solidFill>
+              <a:srgbClr val="C00000"/>
+            </a:solidFill>
+          </a:ln>
+        </p:spPr>
+        <p:style>
+          <a:lnRef idx="2">
+            <a:schemeClr val="accent1">
+              <a:shade val="50000"/>
+            </a:schemeClr>
+          </a:lnRef>
+          <a:fillRef idx="1">
+            <a:schemeClr val="accent1"/>
+          </a:fillRef>
+          <a:effectRef idx="0">
+            <a:schemeClr val="accent1"/>
+          </a:effectRef>
+          <a:fontRef idx="minor">
+            <a:schemeClr val="lt1"/>
+          </a:fontRef>
+        </p:style>
+        <p:txBody>
+          <a:bodyPr rtlCol="0" anchor="ctr"/>
+          <a:lstStyle/>
+          <a:p>
             <a:pPr algn="ctr"/>
-            <a:r>
-              <a:rPr lang="en-US" sz="7200" b="1" dirty="0" smtClean="0"/>
-              <a:t>IF ITS STILL NOT WORKING #1</a:t>
-            </a:r>
-            <a:endParaRPr lang="en-US" sz="7200" b="1" dirty="0" smtClean="0">
-              <a:sym typeface="Wingdings" panose="05000000000000000000" pitchFamily="2" charset="2"/>
+            <a:endParaRPr lang="en-US"/>
+          </a:p>
+        </p:txBody>
+      </p:sp>
+      <p:sp>
+        <p:nvSpPr>
+          <p:cNvPr id="6" name="Oval 5"/>
+          <p:cNvSpPr/>
+          <p:nvPr/>
+        </p:nvSpPr>
+        <p:spPr>
+          <a:xfrm>
+            <a:off x="2723562" y="1117418"/>
+            <a:ext cx="1524000" cy="466725"/>
+          </a:xfrm>
+          <a:prstGeom prst="ellipse">
+            <a:avLst/>
+          </a:prstGeom>
+          <a:noFill/>
+          <a:ln w="44450">
+            <a:solidFill>
+              <a:srgbClr val="C00000"/>
+            </a:solidFill>
+          </a:ln>
+        </p:spPr>
+        <p:style>
+          <a:lnRef idx="2">
+            <a:schemeClr val="accent1">
+              <a:shade val="50000"/>
+            </a:schemeClr>
+          </a:lnRef>
+          <a:fillRef idx="1">
+            <a:schemeClr val="accent1"/>
+          </a:fillRef>
+          <a:effectRef idx="0">
+            <a:schemeClr val="accent1"/>
+          </a:effectRef>
+          <a:fontRef idx="minor">
+            <a:schemeClr val="lt1"/>
+          </a:fontRef>
+        </p:style>
+        <p:txBody>
+          <a:bodyPr rtlCol="0" anchor="ctr"/>
+          <a:lstStyle/>
+          <a:p>
+            <a:pPr algn="ctr"/>
+            <a:endParaRPr lang="en-US"/>
+          </a:p>
+        </p:txBody>
+      </p:sp>
+      <p:sp>
+        <p:nvSpPr>
+          <p:cNvPr id="7" name="Line Callout 1 (Accent Bar) 6"/>
+          <p:cNvSpPr/>
+          <p:nvPr/>
+        </p:nvSpPr>
+        <p:spPr>
+          <a:xfrm>
+            <a:off x="3048000" y="6096000"/>
+            <a:ext cx="1199562" cy="253364"/>
+          </a:xfrm>
+          <a:prstGeom prst="accentCallout1">
+            <a:avLst>
+              <a:gd name="adj1" fmla="val 45417"/>
+              <a:gd name="adj2" fmla="val -2669"/>
+              <a:gd name="adj3" fmla="val -171077"/>
+              <a:gd name="adj4" fmla="val -61873"/>
+            </a:avLst>
+          </a:prstGeom>
+          <a:solidFill>
+            <a:schemeClr val="bg1">
+              <a:lumMod val="85000"/>
+            </a:schemeClr>
+          </a:solidFill>
+          <a:ln>
+            <a:solidFill>
+              <a:schemeClr val="accent2"/>
+            </a:solidFill>
+          </a:ln>
+        </p:spPr>
+        <p:style>
+          <a:lnRef idx="2">
+            <a:schemeClr val="accent1">
+              <a:shade val="50000"/>
+            </a:schemeClr>
+          </a:lnRef>
+          <a:fillRef idx="1">
+            <a:schemeClr val="accent1"/>
+          </a:fillRef>
+          <a:effectRef idx="0">
+            <a:schemeClr val="accent1"/>
+          </a:effectRef>
+          <a:fontRef idx="minor">
+            <a:schemeClr val="lt1"/>
+          </a:fontRef>
+        </p:style>
+        <p:txBody>
+          <a:bodyPr lIns="0" tIns="0" rIns="0" bIns="0" rtlCol="0" anchor="ctr"/>
+          <a:lstStyle/>
+          <a:p>
+            <a:r>
+              <a:rPr lang="en-US" sz="1200" dirty="0" smtClean="0">
+                <a:solidFill>
+                  <a:schemeClr val="tx1"/>
+                </a:solidFill>
+              </a:rPr>
+              <a:t>Stop “rules” log</a:t>
+            </a:r>
+            <a:endParaRPr lang="en-US" sz="1200" dirty="0">
+              <a:solidFill>
+                <a:schemeClr val="tx1"/>
+              </a:solidFill>
             </a:endParaRPr>
-          </a:p>
-          <a:p>
-            <a:pPr algn="ctr"/>
-            <a:r>
-              <a:rPr lang="en-US" sz="7200" b="1" dirty="0" smtClean="0"/>
-              <a:t/>
-            </a:r>
-            <a:br>
-              <a:rPr lang="en-US" sz="7200" b="1" dirty="0" smtClean="0"/>
-            </a:br>
-            <a:r>
-              <a:rPr lang="en-US" sz="2000" b="1" i="1" dirty="0"/>
-              <a:t>D</a:t>
-            </a:r>
-            <a:r>
-              <a:rPr lang="en-US" sz="2000" b="1" i="1" dirty="0" smtClean="0"/>
-              <a:t>o the reboot and confirm you have </a:t>
-            </a:r>
-            <a:r>
-              <a:rPr lang="en-US" sz="2000" b="1" i="1" dirty="0" err="1" smtClean="0"/>
-              <a:t>shortports</a:t>
-            </a:r>
-            <a:r>
-              <a:rPr lang="en-US" sz="2000" b="1" i="1" dirty="0" smtClean="0"/>
-              <a:t> (“BMT1”) in all 6 pages. </a:t>
-            </a:r>
-            <a:br>
-              <a:rPr lang="en-US" sz="2000" b="1" i="1" dirty="0" smtClean="0"/>
-            </a:br>
-            <a:r>
-              <a:rPr lang="en-US" sz="2000" b="1" i="1" dirty="0" smtClean="0"/>
-              <a:t>If still having long ports, set “</a:t>
-            </a:r>
-            <a:r>
-              <a:rPr lang="en-US" sz="2000" b="1" i="1" dirty="0" err="1" smtClean="0"/>
-              <a:t>Bome</a:t>
-            </a:r>
-            <a:r>
-              <a:rPr lang="en-US" sz="2000" b="1" i="1" dirty="0" smtClean="0"/>
-              <a:t> midi Translator” manually to all 6 pages</a:t>
-            </a:r>
           </a:p>
         </p:txBody>
       </p:sp>
     </p:spTree>
     <p:extLst>
       <p:ext uri="{BB962C8B-B14F-4D97-AF65-F5344CB8AC3E}">
-        <p14:creationId xmlns:p14="http://schemas.microsoft.com/office/powerpoint/2010/main" val="2789021689"/>
+        <p14:creationId xmlns:p14="http://schemas.microsoft.com/office/powerpoint/2010/main" val="37768991"/>
       </p:ext>
     </p:extLst>
   </p:cSld>
   <p:clrMapOvr>
     <a:masterClrMapping/>
   </p:clrMapOvr>
-  <p:timing>
-    <p:tnLst>
-      <p:par>
-        <p:cTn id="1" dur="indefinite" restart="never" nodeType="tmRoot"/>
-      </p:par>
-    </p:tnLst>
-  </p:timing>
 </p:sld>
 </file>
 
@@ -10333,6 +11347,164 @@
         <p:spPr>
           <a:xfrm>
             <a:off x="381000" y="914400"/>
+            <a:ext cx="8458200" cy="5570756"/>
+          </a:xfrm>
+          <a:prstGeom prst="rect">
+            <a:avLst/>
+          </a:prstGeom>
+          <a:noFill/>
+        </p:spPr>
+        <p:txBody>
+          <a:bodyPr wrap="square" rtlCol="0">
+            <a:spAutoFit/>
+          </a:bodyPr>
+          <a:lstStyle/>
+          <a:p>
+            <a:pPr algn="ctr"/>
+            <a:r>
+              <a:rPr lang="en-US" sz="7200" b="1" dirty="0" smtClean="0"/>
+              <a:t>IF ITS STILL NOT WORKING #1</a:t>
+            </a:r>
+            <a:endParaRPr lang="en-US" sz="7200" b="1" dirty="0" smtClean="0">
+              <a:sym typeface="Wingdings" panose="05000000000000000000" pitchFamily="2" charset="2"/>
+            </a:endParaRPr>
+          </a:p>
+          <a:p>
+            <a:pPr algn="ctr"/>
+            <a:r>
+              <a:rPr lang="en-US" sz="7200" b="1" dirty="0" smtClean="0"/>
+              <a:t/>
+            </a:r>
+            <a:br>
+              <a:rPr lang="en-US" sz="7200" b="1" dirty="0" smtClean="0"/>
+            </a:br>
+            <a:r>
+              <a:rPr lang="en-US" sz="2000" b="1" i="1" dirty="0"/>
+              <a:t>R</a:t>
+            </a:r>
+            <a:r>
+              <a:rPr lang="en-US" sz="2000" b="1" i="1" dirty="0" smtClean="0"/>
+              <a:t>e-confirm you have the “</a:t>
+            </a:r>
+            <a:r>
+              <a:rPr lang="en-US" sz="2000" b="1" i="1" dirty="0" err="1" smtClean="0"/>
+              <a:t>Bome</a:t>
+            </a:r>
+            <a:r>
+              <a:rPr lang="en-US" sz="2000" b="1" i="1" dirty="0" smtClean="0"/>
+              <a:t> midi Translator 1” on all 6x pages. </a:t>
+            </a:r>
+          </a:p>
+          <a:p>
+            <a:pPr algn="ctr"/>
+            <a:r>
+              <a:rPr lang="en-US" sz="2000" b="1" i="1" dirty="0" smtClean="0"/>
+              <a:t>Re-confirm the DDJ-1000 is the audio device and is on the output/input </a:t>
+            </a:r>
+            <a:r>
+              <a:rPr lang="en-US" sz="2000" b="1" i="1" dirty="0" smtClean="0"/>
+              <a:t>routing</a:t>
+            </a:r>
+          </a:p>
+          <a:p>
+            <a:pPr algn="ctr"/>
+            <a:endParaRPr lang="en-US" sz="2000" b="1" i="1" dirty="0" smtClean="0"/>
+          </a:p>
+          <a:p>
+            <a:pPr algn="ctr"/>
+            <a:r>
+              <a:rPr lang="en-US" sz="2000" b="1" i="1" dirty="0" smtClean="0"/>
+              <a:t>Advanced: Try setting the device to forced MIDI mode </a:t>
+            </a:r>
+            <a:r>
+              <a:rPr lang="en-US" sz="2000" dirty="0" smtClean="0"/>
+              <a:t>(page </a:t>
+            </a:r>
+            <a:r>
+              <a:rPr lang="en-US" sz="2000" dirty="0"/>
+              <a:t>26 of the DDJ-1000 </a:t>
+            </a:r>
+            <a:r>
+              <a:rPr lang="en-US" sz="2000" dirty="0" smtClean="0"/>
+              <a:t>manual)</a:t>
+            </a:r>
+            <a:r>
+              <a:rPr lang="en-US" sz="2000" dirty="0"/>
+              <a:t/>
+            </a:r>
+            <a:br>
+              <a:rPr lang="en-US" sz="2000" dirty="0"/>
+            </a:br>
+            <a:r>
+              <a:rPr lang="en-US" sz="2000" dirty="0" smtClean="0"/>
+              <a:t>Steps: </a:t>
+            </a:r>
+            <a:r>
+              <a:rPr lang="en-US" sz="2000" dirty="0"/>
+              <a:t>no USB cable, power off, left Play + </a:t>
+            </a:r>
+            <a:r>
+              <a:rPr lang="en-US" sz="2000" dirty="0" err="1"/>
+              <a:t>Shift+Turn</a:t>
+            </a:r>
+            <a:r>
+              <a:rPr lang="en-US" sz="2000" dirty="0"/>
+              <a:t> on, left Slip Reverse </a:t>
+            </a:r>
+            <a:r>
+              <a:rPr lang="en-US" sz="2000" dirty="0" smtClean="0"/>
+              <a:t>ON;  power ON, insert USB cable.</a:t>
+            </a:r>
+            <a:endParaRPr lang="en-US" sz="2000" b="1" i="1" dirty="0" smtClean="0"/>
+          </a:p>
+        </p:txBody>
+      </p:sp>
+    </p:spTree>
+    <p:extLst>
+      <p:ext uri="{BB962C8B-B14F-4D97-AF65-F5344CB8AC3E}">
+        <p14:creationId xmlns:p14="http://schemas.microsoft.com/office/powerpoint/2010/main" val="2789021689"/>
+      </p:ext>
+    </p:extLst>
+  </p:cSld>
+  <p:clrMapOvr>
+    <a:masterClrMapping/>
+  </p:clrMapOvr>
+  <p:timing>
+    <p:tnLst>
+      <p:par>
+        <p:cTn id="1" dur="indefinite" restart="never" nodeType="tmRoot"/>
+      </p:par>
+    </p:tnLst>
+  </p:timing>
+</p:sld>
+</file>
+
+<file path=ppt/slides/slide31.xml><?xml version="1.0" encoding="utf-8"?>
+<p:sld xmlns:a="http://schemas.openxmlformats.org/drawingml/2006/main" xmlns:r="http://schemas.openxmlformats.org/officeDocument/2006/relationships" xmlns:p="http://schemas.openxmlformats.org/presentationml/2006/main">
+  <p:cSld>
+    <p:spTree>
+      <p:nvGrpSpPr>
+        <p:cNvPr id="1" name=""/>
+        <p:cNvGrpSpPr/>
+        <p:nvPr/>
+      </p:nvGrpSpPr>
+      <p:grpSpPr>
+        <a:xfrm>
+          <a:off x="0" y="0"/>
+          <a:ext cx="0" cy="0"/>
+          <a:chOff x="0" y="0"/>
+          <a:chExt cx="0" cy="0"/>
+        </a:xfrm>
+      </p:grpSpPr>
+      <p:sp>
+        <p:nvSpPr>
+          <p:cNvPr id="3" name="TextBox 2"/>
+          <p:cNvSpPr txBox="1"/>
+          <p:nvPr/>
+        </p:nvSpPr>
+        <p:spPr>
+          <a:xfrm>
+            <a:off x="381000" y="914400"/>
             <a:ext cx="8382000" cy="4647426"/>
           </a:xfrm>
           <a:prstGeom prst="rect">
@@ -10416,6 +11588,236 @@
     <p:extLst>
       <p:ext uri="{BB962C8B-B14F-4D97-AF65-F5344CB8AC3E}">
         <p14:creationId xmlns:p14="http://schemas.microsoft.com/office/powerpoint/2010/main" val="3496341033"/>
+      </p:ext>
+    </p:extLst>
+  </p:cSld>
+  <p:clrMapOvr>
+    <a:masterClrMapping/>
+  </p:clrMapOvr>
+  <p:timing>
+    <p:tnLst>
+      <p:par>
+        <p:cTn id="1" dur="indefinite" restart="never" nodeType="tmRoot"/>
+      </p:par>
+    </p:tnLst>
+  </p:timing>
+</p:sld>
+</file>
+
+<file path=ppt/slides/slide32.xml><?xml version="1.0" encoding="utf-8"?>
+<p:sld xmlns:a="http://schemas.openxmlformats.org/drawingml/2006/main" xmlns:r="http://schemas.openxmlformats.org/officeDocument/2006/relationships" xmlns:p="http://schemas.openxmlformats.org/presentationml/2006/main">
+  <p:cSld>
+    <p:spTree>
+      <p:nvGrpSpPr>
+        <p:cNvPr id="1" name=""/>
+        <p:cNvGrpSpPr/>
+        <p:nvPr/>
+      </p:nvGrpSpPr>
+      <p:grpSpPr>
+        <a:xfrm>
+          <a:off x="0" y="0"/>
+          <a:ext cx="0" cy="0"/>
+          <a:chOff x="0" y="0"/>
+          <a:chExt cx="0" cy="0"/>
+        </a:xfrm>
+      </p:grpSpPr>
+      <p:sp>
+        <p:nvSpPr>
+          <p:cNvPr id="3" name="TextBox 2"/>
+          <p:cNvSpPr txBox="1"/>
+          <p:nvPr/>
+        </p:nvSpPr>
+        <p:spPr>
+          <a:xfrm>
+            <a:off x="381000" y="914400"/>
+            <a:ext cx="8382000" cy="1200329"/>
+          </a:xfrm>
+          <a:prstGeom prst="rect">
+            <a:avLst/>
+          </a:prstGeom>
+          <a:noFill/>
+        </p:spPr>
+        <p:txBody>
+          <a:bodyPr wrap="square" rtlCol="0">
+            <a:spAutoFit/>
+          </a:bodyPr>
+          <a:lstStyle/>
+          <a:p>
+            <a:pPr algn="ctr"/>
+            <a:r>
+              <a:rPr lang="en-US" sz="7200" b="1" dirty="0" smtClean="0"/>
+              <a:t>ANNEX: DDJ-800</a:t>
+            </a:r>
+            <a:endParaRPr lang="en-US" sz="2000" b="1" i="1" dirty="0"/>
+          </a:p>
+        </p:txBody>
+      </p:sp>
+      <p:pic>
+        <p:nvPicPr>
+          <p:cNvPr id="1026" name="Picture 2"/>
+          <p:cNvPicPr>
+            <a:picLocks noChangeAspect="1" noChangeArrowheads="1"/>
+          </p:cNvPicPr>
+          <p:nvPr/>
+        </p:nvPicPr>
+        <p:blipFill>
+          <a:blip r:embed="rId2">
+            <a:extLst>
+              <a:ext uri="{28A0092B-C50C-407E-A947-70E740481C1C}">
+                <a14:useLocalDpi xmlns:a14="http://schemas.microsoft.com/office/drawing/2010/main" val="0"/>
+              </a:ext>
+            </a:extLst>
+          </a:blip>
+          <a:srcRect/>
+          <a:stretch>
+            <a:fillRect/>
+          </a:stretch>
+        </p:blipFill>
+        <p:spPr bwMode="auto">
+          <a:xfrm>
+            <a:off x="304799" y="2209800"/>
+            <a:ext cx="2259263" cy="3962400"/>
+          </a:xfrm>
+          <a:prstGeom prst="rect">
+            <a:avLst/>
+          </a:prstGeom>
+          <a:noFill/>
+          <a:ln>
+            <a:noFill/>
+          </a:ln>
+          <a:extLst>
+            <a:ext uri="{909E8E84-426E-40DD-AFC4-6F175D3DCCD1}">
+              <a14:hiddenFill xmlns:a14="http://schemas.microsoft.com/office/drawing/2010/main">
+                <a:solidFill>
+                  <a:schemeClr val="accent1"/>
+                </a:solidFill>
+              </a14:hiddenFill>
+            </a:ext>
+            <a:ext uri="{91240B29-F687-4F45-9708-019B960494DF}">
+              <a14:hiddenLine xmlns:a14="http://schemas.microsoft.com/office/drawing/2010/main" w="9525">
+                <a:solidFill>
+                  <a:schemeClr val="tx1"/>
+                </a:solidFill>
+                <a:miter lim="800000"/>
+                <a:headEnd/>
+                <a:tailEnd/>
+              </a14:hiddenLine>
+            </a:ext>
+          </a:extLst>
+        </p:spPr>
+      </p:pic>
+      <p:pic>
+        <p:nvPicPr>
+          <p:cNvPr id="1027" name="Picture 3"/>
+          <p:cNvPicPr>
+            <a:picLocks noChangeAspect="1" noChangeArrowheads="1"/>
+          </p:cNvPicPr>
+          <p:nvPr/>
+        </p:nvPicPr>
+        <p:blipFill>
+          <a:blip r:embed="rId3">
+            <a:extLst>
+              <a:ext uri="{28A0092B-C50C-407E-A947-70E740481C1C}">
+                <a14:useLocalDpi xmlns:a14="http://schemas.microsoft.com/office/drawing/2010/main" val="0"/>
+              </a:ext>
+            </a:extLst>
+          </a:blip>
+          <a:srcRect/>
+          <a:stretch>
+            <a:fillRect/>
+          </a:stretch>
+        </p:blipFill>
+        <p:spPr bwMode="auto">
+          <a:xfrm>
+            <a:off x="5503676" y="2381294"/>
+            <a:ext cx="3230749" cy="3619411"/>
+          </a:xfrm>
+          <a:prstGeom prst="rect">
+            <a:avLst/>
+          </a:prstGeom>
+          <a:noFill/>
+          <a:ln>
+            <a:noFill/>
+          </a:ln>
+          <a:extLst>
+            <a:ext uri="{909E8E84-426E-40DD-AFC4-6F175D3DCCD1}">
+              <a14:hiddenFill xmlns:a14="http://schemas.microsoft.com/office/drawing/2010/main">
+                <a:solidFill>
+                  <a:schemeClr val="accent1"/>
+                </a:solidFill>
+              </a14:hiddenFill>
+            </a:ext>
+            <a:ext uri="{91240B29-F687-4F45-9708-019B960494DF}">
+              <a14:hiddenLine xmlns:a14="http://schemas.microsoft.com/office/drawing/2010/main" w="9525">
+                <a:solidFill>
+                  <a:schemeClr val="tx1"/>
+                </a:solidFill>
+                <a:miter lim="800000"/>
+                <a:headEnd/>
+                <a:tailEnd/>
+              </a14:hiddenLine>
+            </a:ext>
+          </a:extLst>
+        </p:spPr>
+      </p:pic>
+      <p:pic>
+        <p:nvPicPr>
+          <p:cNvPr id="1028" name="Picture 4"/>
+          <p:cNvPicPr>
+            <a:picLocks noChangeAspect="1" noChangeArrowheads="1"/>
+          </p:cNvPicPr>
+          <p:nvPr/>
+        </p:nvPicPr>
+        <p:blipFill>
+          <a:blip r:embed="rId4">
+            <a:extLst>
+              <a:ext uri="{28A0092B-C50C-407E-A947-70E740481C1C}">
+                <a14:useLocalDpi xmlns:a14="http://schemas.microsoft.com/office/drawing/2010/main" val="0"/>
+              </a:ext>
+            </a:extLst>
+          </a:blip>
+          <a:srcRect/>
+          <a:stretch>
+            <a:fillRect/>
+          </a:stretch>
+        </p:blipFill>
+        <p:spPr bwMode="auto">
+          <a:xfrm>
+            <a:off x="2819400" y="2371769"/>
+            <a:ext cx="3784403" cy="4248150"/>
+          </a:xfrm>
+          <a:prstGeom prst="rect">
+            <a:avLst/>
+          </a:prstGeom>
+          <a:noFill/>
+          <a:ln>
+            <a:noFill/>
+          </a:ln>
+          <a:extLst>
+            <a:ext uri="{909E8E84-426E-40DD-AFC4-6F175D3DCCD1}">
+              <a14:hiddenFill xmlns:a14="http://schemas.microsoft.com/office/drawing/2010/main">
+                <a:solidFill>
+                  <a:schemeClr val="accent1"/>
+                </a:solidFill>
+              </a14:hiddenFill>
+            </a:ext>
+            <a:ext uri="{91240B29-F687-4F45-9708-019B960494DF}">
+              <a14:hiddenLine xmlns:a14="http://schemas.microsoft.com/office/drawing/2010/main" w="9525">
+                <a:solidFill>
+                  <a:schemeClr val="tx1"/>
+                </a:solidFill>
+                <a:miter lim="800000"/>
+                <a:headEnd/>
+                <a:tailEnd/>
+              </a14:hiddenLine>
+            </a:ext>
+          </a:extLst>
+        </p:spPr>
+      </p:pic>
+    </p:spTree>
+    <p:extLst>
+      <p:ext uri="{BB962C8B-B14F-4D97-AF65-F5344CB8AC3E}">
+        <p14:creationId xmlns:p14="http://schemas.microsoft.com/office/powerpoint/2010/main" val="3623482296"/>
       </p:ext>
     </p:extLst>
   </p:cSld>
@@ -11426,7 +12828,7 @@
         <p:spPr>
           <a:xfrm>
             <a:off x="152400" y="111145"/>
-            <a:ext cx="2054730" cy="461665"/>
+            <a:ext cx="1983235" cy="461665"/>
           </a:xfrm>
           <a:prstGeom prst="rect">
             <a:avLst/>
@@ -11441,7 +12843,7 @@
           <a:p>
             <a:r>
               <a:rPr lang="en-US" sz="2400" i="1" u="sng" dirty="0" smtClean="0"/>
-              <a:t>BOME: Devices</a:t>
+              <a:t>BOME: Aliases</a:t>
             </a:r>
             <a:endParaRPr lang="en-US" sz="2400" i="1" u="sng" dirty="0"/>
           </a:p>
@@ -11449,7 +12851,7 @@
       </p:sp>
       <p:pic>
         <p:nvPicPr>
-          <p:cNvPr id="2" name="Picture 2" descr="C:\Users\Pedro\Desktop\Z_DRIVE_Pedro\2 Music - Controllers\0_MAPS_Traktor\DDJ Pioneer\v6.5.0 - DDJ-1000 - TP3_TP2 BOME\Support files\Source files\Installation\1 - BOME - correct startup log.JPG"/>
+          <p:cNvPr id="7" name="Picture 6"/>
           <p:cNvPicPr>
             <a:picLocks noChangeAspect="1" noChangeArrowheads="1"/>
           </p:cNvPicPr>
@@ -11463,23 +12865,31 @@
               </a:ext>
             </a:extLst>
           </a:blip>
-          <a:srcRect l="64000" b="33404"/>
+          <a:srcRect l="4095" t="2784" r="3817" b="4481"/>
           <a:stretch/>
         </p:blipFill>
         <p:spPr bwMode="auto">
           <a:xfrm>
-            <a:off x="4634770" y="686383"/>
-            <a:ext cx="3334265" cy="5708592"/>
+            <a:off x="2362200" y="1371600"/>
+            <a:ext cx="4082422" cy="4150623"/>
           </a:xfrm>
           <a:prstGeom prst="rect">
             <a:avLst/>
           </a:prstGeom>
           <a:noFill/>
+          <a:ln w="9525">
+            <a:solidFill>
+              <a:schemeClr val="tx1"/>
+            </a:solidFill>
+            <a:miter lim="800000"/>
+            <a:headEnd/>
+            <a:tailEnd/>
+          </a:ln>
           <a:extLst>
             <a:ext uri="{909E8E84-426E-40DD-AFC4-6F175D3DCCD1}">
               <a14:hiddenFill xmlns:a14="http://schemas.microsoft.com/office/drawing/2010/main">
                 <a:solidFill>
-                  <a:srgbClr val="FFFFFF"/>
+                  <a:schemeClr val="accent1"/>
                 </a:solidFill>
               </a14:hiddenFill>
             </a:ext>
@@ -11488,24 +12898,18 @@
       </p:pic>
       <p:sp>
         <p:nvSpPr>
-          <p:cNvPr id="32" name="Oval 31"/>
+          <p:cNvPr id="3" name="Right Arrow 2"/>
           <p:cNvSpPr/>
           <p:nvPr/>
         </p:nvSpPr>
         <p:spPr>
           <a:xfrm>
-            <a:off x="4643008" y="2955907"/>
-            <a:ext cx="2986130" cy="465906"/>
-          </a:xfrm>
-          <a:prstGeom prst="ellipse">
-            <a:avLst/>
-          </a:prstGeom>
-          <a:noFill/>
-          <a:ln w="44450">
-            <a:solidFill>
-              <a:srgbClr val="C00000"/>
-            </a:solidFill>
-          </a:ln>
+            <a:off x="1144017" y="1981200"/>
+            <a:ext cx="913383" cy="2667000"/>
+          </a:xfrm>
+          <a:prstGeom prst="rightArrow">
+            <a:avLst/>
+          </a:prstGeom>
         </p:spPr>
         <p:style>
           <a:lnRef idx="2">
@@ -11532,234 +12936,10 @@
           </a:p>
         </p:txBody>
       </p:sp>
-      <p:sp>
-        <p:nvSpPr>
-          <p:cNvPr id="10" name="Line Callout 1 (Accent Bar) 9"/>
-          <p:cNvSpPr/>
-          <p:nvPr/>
-        </p:nvSpPr>
-        <p:spPr>
-          <a:xfrm>
-            <a:off x="304800" y="1574826"/>
-            <a:ext cx="3514725" cy="1549374"/>
-          </a:xfrm>
-          <a:prstGeom prst="accentCallout1">
-            <a:avLst>
-              <a:gd name="adj1" fmla="val 46930"/>
-              <a:gd name="adj2" fmla="val 101571"/>
-              <a:gd name="adj3" fmla="val 96628"/>
-              <a:gd name="adj4" fmla="val 123089"/>
-            </a:avLst>
-          </a:prstGeom>
-          <a:solidFill>
-            <a:schemeClr val="bg1">
-              <a:lumMod val="85000"/>
-            </a:schemeClr>
-          </a:solidFill>
-          <a:ln>
-            <a:solidFill>
-              <a:schemeClr val="accent2"/>
-            </a:solidFill>
-          </a:ln>
-        </p:spPr>
-        <p:style>
-          <a:lnRef idx="2">
-            <a:schemeClr val="accent1">
-              <a:shade val="50000"/>
-            </a:schemeClr>
-          </a:lnRef>
-          <a:fillRef idx="1">
-            <a:schemeClr val="accent1"/>
-          </a:fillRef>
-          <a:effectRef idx="0">
-            <a:schemeClr val="accent1"/>
-          </a:effectRef>
-          <a:fontRef idx="minor">
-            <a:schemeClr val="lt1"/>
-          </a:fontRef>
-        </p:style>
-        <p:txBody>
-          <a:bodyPr lIns="0" tIns="0" rIns="0" bIns="0" rtlCol="0" anchor="ctr"/>
-          <a:lstStyle/>
-          <a:p>
-            <a:r>
-              <a:rPr lang="en-US" sz="1200" u="sng" dirty="0">
-                <a:solidFill>
-                  <a:schemeClr val="tx1"/>
-                </a:solidFill>
-              </a:rPr>
-              <a:t>confirm </a:t>
-            </a:r>
-            <a:r>
-              <a:rPr lang="en-US" sz="1200" u="sng" dirty="0" smtClean="0">
-                <a:solidFill>
-                  <a:schemeClr val="tx1"/>
-                </a:solidFill>
-              </a:rPr>
-              <a:t>the devices </a:t>
-            </a:r>
-            <a:r>
-              <a:rPr lang="en-US" sz="1200" u="sng" dirty="0">
-                <a:solidFill>
-                  <a:schemeClr val="tx1"/>
-                </a:solidFill>
-              </a:rPr>
-              <a:t>are OPEN!</a:t>
-            </a:r>
-          </a:p>
-          <a:p>
-            <a:endParaRPr lang="en-US" sz="1200" dirty="0" smtClean="0">
-              <a:solidFill>
-                <a:schemeClr val="tx1"/>
-              </a:solidFill>
-            </a:endParaRPr>
-          </a:p>
-          <a:p>
-            <a:r>
-              <a:rPr lang="en-US" sz="1200" dirty="0" smtClean="0">
-                <a:solidFill>
-                  <a:schemeClr val="tx1"/>
-                </a:solidFill>
-              </a:rPr>
-              <a:t>Default is ONLY :</a:t>
-            </a:r>
-            <a:br>
-              <a:rPr lang="en-US" sz="1200" dirty="0" smtClean="0">
-                <a:solidFill>
-                  <a:schemeClr val="tx1"/>
-                </a:solidFill>
-              </a:rPr>
-            </a:br>
-            <a:r>
-              <a:rPr lang="en-US" sz="1200" dirty="0" smtClean="0">
-                <a:solidFill>
-                  <a:schemeClr val="tx1"/>
-                </a:solidFill>
-              </a:rPr>
-              <a:t>- “From </a:t>
-            </a:r>
-            <a:r>
-              <a:rPr lang="en-US" sz="1200" dirty="0" err="1" smtClean="0">
-                <a:solidFill>
-                  <a:schemeClr val="tx1"/>
-                </a:solidFill>
-              </a:rPr>
-              <a:t>Traktor</a:t>
-            </a:r>
-            <a:r>
-              <a:rPr lang="en-US" sz="1200" dirty="0" smtClean="0">
-                <a:solidFill>
-                  <a:schemeClr val="tx1"/>
-                </a:solidFill>
-              </a:rPr>
-              <a:t>”  OPEN</a:t>
-            </a:r>
-            <a:br>
-              <a:rPr lang="en-US" sz="1200" dirty="0" smtClean="0">
-                <a:solidFill>
-                  <a:schemeClr val="tx1"/>
-                </a:solidFill>
-              </a:rPr>
-            </a:br>
-            <a:r>
-              <a:rPr lang="en-US" sz="1200" dirty="0" smtClean="0">
-                <a:solidFill>
-                  <a:schemeClr val="tx1"/>
-                </a:solidFill>
-              </a:rPr>
-              <a:t>- “to DDJ”  OPEN</a:t>
-            </a:r>
-          </a:p>
-          <a:p>
-            <a:endParaRPr lang="en-US" sz="1200" dirty="0">
-              <a:solidFill>
-                <a:schemeClr val="tx1"/>
-              </a:solidFill>
-            </a:endParaRPr>
-          </a:p>
-          <a:p>
-            <a:r>
-              <a:rPr lang="en-US" sz="1200" dirty="0" smtClean="0">
-                <a:solidFill>
-                  <a:schemeClr val="tx1"/>
-                </a:solidFill>
-              </a:rPr>
-              <a:t>If you have problems here confirm tat </a:t>
-            </a:r>
-            <a:r>
-              <a:rPr lang="en-US" sz="1200" dirty="0" err="1" smtClean="0">
-                <a:solidFill>
-                  <a:schemeClr val="tx1"/>
-                </a:solidFill>
-              </a:rPr>
-              <a:t>Rekordbox</a:t>
-            </a:r>
-            <a:r>
-              <a:rPr lang="en-US" sz="1200" dirty="0" smtClean="0">
-                <a:solidFill>
-                  <a:schemeClr val="tx1"/>
-                </a:solidFill>
-              </a:rPr>
-              <a:t> Performance works in your system</a:t>
-            </a:r>
-            <a:endParaRPr lang="en-US" sz="1200" dirty="0">
-              <a:solidFill>
-                <a:schemeClr val="tx1"/>
-              </a:solidFill>
-            </a:endParaRPr>
-          </a:p>
-        </p:txBody>
-      </p:sp>
-      <p:sp>
-        <p:nvSpPr>
-          <p:cNvPr id="12" name="Oval 11"/>
-          <p:cNvSpPr/>
-          <p:nvPr/>
-        </p:nvSpPr>
-        <p:spPr>
-          <a:xfrm>
-            <a:off x="4632711" y="5241907"/>
-            <a:ext cx="2986130" cy="457200"/>
-          </a:xfrm>
-          <a:prstGeom prst="ellipse">
-            <a:avLst/>
-          </a:prstGeom>
-          <a:noFill/>
-          <a:ln w="44450">
-            <a:solidFill>
-              <a:srgbClr val="C00000"/>
-            </a:solidFill>
-          </a:ln>
-        </p:spPr>
-        <p:style>
-          <a:lnRef idx="2">
-            <a:schemeClr val="accent1">
-              <a:shade val="50000"/>
-            </a:schemeClr>
-          </a:lnRef>
-          <a:fillRef idx="1">
-            <a:schemeClr val="accent1"/>
-          </a:fillRef>
-          <a:effectRef idx="0">
-            <a:schemeClr val="accent1"/>
-          </a:effectRef>
-          <a:fontRef idx="minor">
-            <a:schemeClr val="lt1"/>
-          </a:fontRef>
-        </p:style>
-        <p:txBody>
-          <a:bodyPr rtlCol="0" anchor="ctr"/>
-          <a:lstStyle/>
-          <a:p>
-            <a:pPr algn="ctr"/>
-            <a:endParaRPr lang="en-US"/>
-          </a:p>
-        </p:txBody>
-      </p:sp>
     </p:spTree>
     <p:extLst>
       <p:ext uri="{BB962C8B-B14F-4D97-AF65-F5344CB8AC3E}">
-        <p14:creationId xmlns:p14="http://schemas.microsoft.com/office/powerpoint/2010/main" val="780315154"/>
+        <p14:creationId xmlns:p14="http://schemas.microsoft.com/office/powerpoint/2010/main" val="2128318378"/>
       </p:ext>
     </p:extLst>
   </p:cSld>
@@ -11786,45 +12966,15 @@
           <a:chExt cx="0" cy="0"/>
         </a:xfrm>
       </p:grpSpPr>
-      <p:sp>
-        <p:nvSpPr>
-          <p:cNvPr id="33" name="TextBox 32"/>
-          <p:cNvSpPr txBox="1"/>
-          <p:nvPr/>
-        </p:nvSpPr>
-        <p:spPr>
-          <a:xfrm>
-            <a:off x="152400" y="111145"/>
-            <a:ext cx="1983235" cy="461665"/>
-          </a:xfrm>
-          <a:prstGeom prst="rect">
-            <a:avLst/>
-          </a:prstGeom>
-          <a:noFill/>
-        </p:spPr>
-        <p:txBody>
-          <a:bodyPr wrap="none" rtlCol="0">
-            <a:spAutoFit/>
-          </a:bodyPr>
-          <a:lstStyle/>
-          <a:p>
-            <a:r>
-              <a:rPr lang="en-US" sz="2400" i="1" u="sng" dirty="0" smtClean="0"/>
-              <a:t>BOME: Aliases</a:t>
-            </a:r>
-            <a:endParaRPr lang="en-US" sz="2400" i="1" u="sng" dirty="0"/>
-          </a:p>
-        </p:txBody>
-      </p:sp>
       <p:pic>
         <p:nvPicPr>
-          <p:cNvPr id="7" name="Picture 6"/>
+          <p:cNvPr id="1026" name="Picture 2"/>
           <p:cNvPicPr>
             <a:picLocks noChangeAspect="1" noChangeArrowheads="1"/>
           </p:cNvPicPr>
           <p:nvPr/>
         </p:nvPicPr>
-        <p:blipFill rotWithShape="1">
+        <p:blipFill>
           <a:blip r:embed="rId2">
             <a:extLst>
               <a:ext uri="{28A0092B-C50C-407E-A947-70E740481C1C}">
@@ -11832,25 +12982,22 @@
               </a:ext>
             </a:extLst>
           </a:blip>
-          <a:srcRect l="4095" t="2784" r="3817" b="4481"/>
-          <a:stretch/>
+          <a:srcRect/>
+          <a:stretch>
+            <a:fillRect/>
+          </a:stretch>
         </p:blipFill>
         <p:spPr bwMode="auto">
           <a:xfrm>
-            <a:off x="2362200" y="1371600"/>
-            <a:ext cx="4082422" cy="4150623"/>
+            <a:off x="4613661" y="341977"/>
+            <a:ext cx="3673089" cy="6370959"/>
           </a:xfrm>
           <a:prstGeom prst="rect">
             <a:avLst/>
           </a:prstGeom>
           <a:noFill/>
-          <a:ln w="9525">
-            <a:solidFill>
-              <a:schemeClr val="tx1"/>
-            </a:solidFill>
-            <a:miter lim="800000"/>
-            <a:headEnd/>
-            <a:tailEnd/>
+          <a:ln>
+            <a:noFill/>
           </a:ln>
           <a:extLst>
             <a:ext uri="{909E8E84-426E-40DD-AFC4-6F175D3DCCD1}">
@@ -11860,23 +13007,69 @@
                 </a:solidFill>
               </a14:hiddenFill>
             </a:ext>
+            <a:ext uri="{91240B29-F687-4F45-9708-019B960494DF}">
+              <a14:hiddenLine xmlns:a14="http://schemas.microsoft.com/office/drawing/2010/main" w="9525">
+                <a:solidFill>
+                  <a:schemeClr val="tx1"/>
+                </a:solidFill>
+                <a:miter lim="800000"/>
+                <a:headEnd/>
+                <a:tailEnd/>
+              </a14:hiddenLine>
+            </a:ext>
           </a:extLst>
         </p:spPr>
       </p:pic>
       <p:sp>
         <p:nvSpPr>
-          <p:cNvPr id="3" name="Right Arrow 2"/>
+          <p:cNvPr id="33" name="TextBox 32"/>
+          <p:cNvSpPr txBox="1"/>
+          <p:nvPr/>
+        </p:nvSpPr>
+        <p:spPr>
+          <a:xfrm>
+            <a:off x="152400" y="111145"/>
+            <a:ext cx="2054730" cy="461665"/>
+          </a:xfrm>
+          <a:prstGeom prst="rect">
+            <a:avLst/>
+          </a:prstGeom>
+          <a:noFill/>
+        </p:spPr>
+        <p:txBody>
+          <a:bodyPr wrap="none" rtlCol="0">
+            <a:spAutoFit/>
+          </a:bodyPr>
+          <a:lstStyle/>
+          <a:p>
+            <a:r>
+              <a:rPr lang="en-US" sz="2400" i="1" u="sng" dirty="0" smtClean="0"/>
+              <a:t>BOME: Devices</a:t>
+            </a:r>
+            <a:endParaRPr lang="en-US" sz="2400" i="1" u="sng" dirty="0"/>
+          </a:p>
+        </p:txBody>
+      </p:sp>
+      <p:sp>
+        <p:nvSpPr>
+          <p:cNvPr id="32" name="Oval 31"/>
           <p:cNvSpPr/>
           <p:nvPr/>
         </p:nvSpPr>
         <p:spPr>
           <a:xfrm>
-            <a:off x="1144017" y="1981200"/>
-            <a:ext cx="913383" cy="2667000"/>
-          </a:xfrm>
-          <a:prstGeom prst="rightArrow">
-            <a:avLst/>
-          </a:prstGeom>
+            <a:off x="4240405" y="685800"/>
+            <a:ext cx="4419600" cy="1219200"/>
+          </a:xfrm>
+          <a:prstGeom prst="ellipse">
+            <a:avLst/>
+          </a:prstGeom>
+          <a:noFill/>
+          <a:ln w="44450">
+            <a:solidFill>
+              <a:srgbClr val="C00000"/>
+            </a:solidFill>
+          </a:ln>
         </p:spPr>
         <p:style>
           <a:lnRef idx="2">
@@ -11903,10 +13096,314 @@
           </a:p>
         </p:txBody>
       </p:sp>
+      <p:sp>
+        <p:nvSpPr>
+          <p:cNvPr id="10" name="Line Callout 1 (Accent Bar) 9"/>
+          <p:cNvSpPr/>
+          <p:nvPr/>
+        </p:nvSpPr>
+        <p:spPr>
+          <a:xfrm>
+            <a:off x="685800" y="1574826"/>
+            <a:ext cx="3133725" cy="1320774"/>
+          </a:xfrm>
+          <a:prstGeom prst="accentCallout1">
+            <a:avLst>
+              <a:gd name="adj1" fmla="val 14622"/>
+              <a:gd name="adj2" fmla="val 101775"/>
+              <a:gd name="adj3" fmla="val -1337"/>
+              <a:gd name="adj4" fmla="val 117949"/>
+            </a:avLst>
+          </a:prstGeom>
+          <a:solidFill>
+            <a:schemeClr val="bg1">
+              <a:lumMod val="85000"/>
+            </a:schemeClr>
+          </a:solidFill>
+          <a:ln w="38100">
+            <a:solidFill>
+              <a:schemeClr val="accent2"/>
+            </a:solidFill>
+          </a:ln>
+        </p:spPr>
+        <p:style>
+          <a:lnRef idx="2">
+            <a:schemeClr val="accent1">
+              <a:shade val="50000"/>
+            </a:schemeClr>
+          </a:lnRef>
+          <a:fillRef idx="1">
+            <a:schemeClr val="accent1"/>
+          </a:fillRef>
+          <a:effectRef idx="0">
+            <a:schemeClr val="accent1"/>
+          </a:effectRef>
+          <a:fontRef idx="minor">
+            <a:schemeClr val="lt1"/>
+          </a:fontRef>
+        </p:style>
+        <p:txBody>
+          <a:bodyPr lIns="0" tIns="0" rIns="0" bIns="0" rtlCol="0" anchor="ctr"/>
+          <a:lstStyle/>
+          <a:p>
+            <a:r>
+              <a:rPr lang="en-US" sz="1200" u="sng" dirty="0" smtClean="0">
+                <a:solidFill>
+                  <a:schemeClr val="tx1"/>
+                </a:solidFill>
+              </a:rPr>
+              <a:t>Confirm the devices </a:t>
+            </a:r>
+            <a:r>
+              <a:rPr lang="en-US" sz="1200" u="sng" dirty="0">
+                <a:solidFill>
+                  <a:schemeClr val="tx1"/>
+                </a:solidFill>
+              </a:rPr>
+              <a:t>are OPEN</a:t>
+            </a:r>
+            <a:r>
+              <a:rPr lang="en-US" sz="1200" u="sng" dirty="0" smtClean="0">
+                <a:solidFill>
+                  <a:schemeClr val="tx1"/>
+                </a:solidFill>
+              </a:rPr>
+              <a:t>!</a:t>
+            </a:r>
+          </a:p>
+          <a:p>
+            <a:endParaRPr lang="en-US" sz="1200" u="sng" dirty="0" smtClean="0">
+              <a:solidFill>
+                <a:schemeClr val="tx1"/>
+              </a:solidFill>
+            </a:endParaRPr>
+          </a:p>
+          <a:p>
+            <a:r>
+              <a:rPr lang="en-US" sz="1200" u="sng" dirty="0" smtClean="0">
+                <a:solidFill>
+                  <a:schemeClr val="tx1"/>
+                </a:solidFill>
+              </a:rPr>
+              <a:t>Ensure ONLY these 2x options are checked:</a:t>
+            </a:r>
+            <a:endParaRPr lang="en-US" sz="1200" u="sng" dirty="0">
+              <a:solidFill>
+                <a:schemeClr val="tx1"/>
+              </a:solidFill>
+            </a:endParaRPr>
+          </a:p>
+          <a:p>
+            <a:r>
+              <a:rPr lang="en-US" sz="1200" dirty="0" smtClean="0">
+                <a:solidFill>
+                  <a:schemeClr val="tx1"/>
+                </a:solidFill>
+              </a:rPr>
+              <a:t>- “From </a:t>
+            </a:r>
+            <a:r>
+              <a:rPr lang="en-US" sz="1200" dirty="0" err="1" smtClean="0">
+                <a:solidFill>
+                  <a:schemeClr val="tx1"/>
+                </a:solidFill>
+              </a:rPr>
+              <a:t>Traktor</a:t>
+            </a:r>
+            <a:r>
+              <a:rPr lang="en-US" sz="1200" dirty="0" smtClean="0">
+                <a:solidFill>
+                  <a:schemeClr val="tx1"/>
+                </a:solidFill>
+              </a:rPr>
+              <a:t>” -&gt; device 1 in OPEN</a:t>
+            </a:r>
+            <a:br>
+              <a:rPr lang="en-US" sz="1200" dirty="0" smtClean="0">
+                <a:solidFill>
+                  <a:schemeClr val="tx1"/>
+                </a:solidFill>
+              </a:rPr>
+            </a:br>
+            <a:r>
+              <a:rPr lang="en-US" sz="1200" dirty="0" smtClean="0">
+                <a:solidFill>
+                  <a:schemeClr val="tx1"/>
+                </a:solidFill>
+              </a:rPr>
+              <a:t>- “to DDJ” -&gt; DDJ-1000 OPEN</a:t>
+            </a:r>
+          </a:p>
+          <a:p>
+            <a:endParaRPr lang="en-US" sz="1200" dirty="0" smtClean="0">
+              <a:solidFill>
+                <a:schemeClr val="tx1"/>
+              </a:solidFill>
+            </a:endParaRPr>
+          </a:p>
+          <a:p>
+            <a:r>
+              <a:rPr lang="en-US" sz="1200" dirty="0" smtClean="0">
+                <a:solidFill>
+                  <a:schemeClr val="tx1"/>
+                </a:solidFill>
+              </a:rPr>
+              <a:t>Confirm it looks EXACTLY like on the picture</a:t>
+            </a:r>
+          </a:p>
+        </p:txBody>
+      </p:sp>
+      <p:sp>
+        <p:nvSpPr>
+          <p:cNvPr id="12" name="Oval 11"/>
+          <p:cNvSpPr/>
+          <p:nvPr/>
+        </p:nvSpPr>
+        <p:spPr>
+          <a:xfrm>
+            <a:off x="4191000" y="2514600"/>
+            <a:ext cx="4648199" cy="1295400"/>
+          </a:xfrm>
+          <a:prstGeom prst="ellipse">
+            <a:avLst/>
+          </a:prstGeom>
+          <a:noFill/>
+          <a:ln w="44450">
+            <a:solidFill>
+              <a:srgbClr val="C00000"/>
+            </a:solidFill>
+          </a:ln>
+        </p:spPr>
+        <p:style>
+          <a:lnRef idx="2">
+            <a:schemeClr val="accent1">
+              <a:shade val="50000"/>
+            </a:schemeClr>
+          </a:lnRef>
+          <a:fillRef idx="1">
+            <a:schemeClr val="accent1"/>
+          </a:fillRef>
+          <a:effectRef idx="0">
+            <a:schemeClr val="accent1"/>
+          </a:effectRef>
+          <a:fontRef idx="minor">
+            <a:schemeClr val="lt1"/>
+          </a:fontRef>
+        </p:style>
+        <p:txBody>
+          <a:bodyPr rtlCol="0" anchor="ctr"/>
+          <a:lstStyle/>
+          <a:p>
+            <a:pPr algn="ctr"/>
+            <a:endParaRPr lang="en-US"/>
+          </a:p>
+        </p:txBody>
+      </p:sp>
+      <p:cxnSp>
+        <p:nvCxnSpPr>
+          <p:cNvPr id="4" name="Straight Connector 3"/>
+          <p:cNvCxnSpPr/>
+          <p:nvPr/>
+        </p:nvCxnSpPr>
+        <p:spPr>
+          <a:xfrm>
+            <a:off x="3886200" y="2667000"/>
+            <a:ext cx="457200" cy="228600"/>
+          </a:xfrm>
+          <a:prstGeom prst="line">
+            <a:avLst/>
+          </a:prstGeom>
+          <a:ln w="28575">
+            <a:solidFill>
+              <a:srgbClr val="C00000"/>
+            </a:solidFill>
+          </a:ln>
+        </p:spPr>
+        <p:style>
+          <a:lnRef idx="1">
+            <a:schemeClr val="accent1"/>
+          </a:lnRef>
+          <a:fillRef idx="0">
+            <a:schemeClr val="accent1"/>
+          </a:fillRef>
+          <a:effectRef idx="0">
+            <a:schemeClr val="accent1"/>
+          </a:effectRef>
+          <a:fontRef idx="minor">
+            <a:schemeClr val="tx1"/>
+          </a:fontRef>
+        </p:style>
+      </p:cxnSp>
+      <p:sp>
+        <p:nvSpPr>
+          <p:cNvPr id="11" name="Line Callout 1 (Accent Bar) 10"/>
+          <p:cNvSpPr/>
+          <p:nvPr/>
+        </p:nvSpPr>
+        <p:spPr>
+          <a:xfrm>
+            <a:off x="485775" y="5334000"/>
+            <a:ext cx="3377565" cy="711174"/>
+          </a:xfrm>
+          <a:prstGeom prst="accentCallout1">
+            <a:avLst>
+              <a:gd name="adj1" fmla="val 14622"/>
+              <a:gd name="adj2" fmla="val 101775"/>
+              <a:gd name="adj3" fmla="val 40532"/>
+              <a:gd name="adj4" fmla="val 147540"/>
+            </a:avLst>
+          </a:prstGeom>
+          <a:solidFill>
+            <a:schemeClr val="bg1">
+              <a:lumMod val="85000"/>
+            </a:schemeClr>
+          </a:solidFill>
+          <a:ln w="38100">
+            <a:solidFill>
+              <a:schemeClr val="accent2"/>
+            </a:solidFill>
+          </a:ln>
+        </p:spPr>
+        <p:style>
+          <a:lnRef idx="2">
+            <a:schemeClr val="accent1">
+              <a:shade val="50000"/>
+            </a:schemeClr>
+          </a:lnRef>
+          <a:fillRef idx="1">
+            <a:schemeClr val="accent1"/>
+          </a:fillRef>
+          <a:effectRef idx="0">
+            <a:schemeClr val="accent1"/>
+          </a:effectRef>
+          <a:fontRef idx="minor">
+            <a:schemeClr val="lt1"/>
+          </a:fontRef>
+        </p:style>
+        <p:txBody>
+          <a:bodyPr lIns="0" tIns="0" rIns="0" bIns="0" rtlCol="0" anchor="ctr"/>
+          <a:lstStyle/>
+          <a:p>
+            <a:r>
+              <a:rPr lang="en-US" sz="1200" u="sng" dirty="0" smtClean="0">
+                <a:solidFill>
+                  <a:schemeClr val="tx1"/>
+                </a:solidFill>
+              </a:rPr>
+              <a:t>Confirm this “cross” on EXACTLY these aliases</a:t>
+            </a:r>
+            <a:endParaRPr lang="en-US" sz="1200" dirty="0" smtClean="0">
+              <a:solidFill>
+                <a:schemeClr val="tx1"/>
+              </a:solidFill>
+            </a:endParaRPr>
+          </a:p>
+        </p:txBody>
+      </p:sp>
     </p:spTree>
     <p:extLst>
       <p:ext uri="{BB962C8B-B14F-4D97-AF65-F5344CB8AC3E}">
-        <p14:creationId xmlns:p14="http://schemas.microsoft.com/office/powerpoint/2010/main" val="2128318378"/>
+        <p14:creationId xmlns:p14="http://schemas.microsoft.com/office/powerpoint/2010/main" val="780315154"/>
       </p:ext>
     </p:extLst>
   </p:cSld>

</xml_diff>